<commit_message>
updated week 7 materials
</commit_message>
<xml_diff>
--- a/1_class_prep/week_7/MISM6202_FacultyConnect_20210622.pptx
+++ b/1_class_prep/week_7/MISM6202_FacultyConnect_20210622.pptx
@@ -5,7 +5,7 @@
     <p:sldMasterId id="2147483648" r:id="rId1"/>
   </p:sldMasterIdLst>
   <p:notesMasterIdLst>
-    <p:notesMasterId r:id="rId16"/>
+    <p:notesMasterId r:id="rId23"/>
   </p:notesMasterIdLst>
   <p:sldIdLst>
     <p:sldId id="256" r:id="rId2"/>
@@ -15,13 +15,20 @@
     <p:sldId id="282" r:id="rId6"/>
     <p:sldId id="290" r:id="rId7"/>
     <p:sldId id="288" r:id="rId8"/>
-    <p:sldId id="265" r:id="rId9"/>
-    <p:sldId id="262" r:id="rId10"/>
-    <p:sldId id="276" r:id="rId11"/>
-    <p:sldId id="294" r:id="rId12"/>
-    <p:sldId id="264" r:id="rId13"/>
-    <p:sldId id="285" r:id="rId14"/>
-    <p:sldId id="275" r:id="rId15"/>
+    <p:sldId id="295" r:id="rId9"/>
+    <p:sldId id="296" r:id="rId10"/>
+    <p:sldId id="301" r:id="rId11"/>
+    <p:sldId id="299" r:id="rId12"/>
+    <p:sldId id="300" r:id="rId13"/>
+    <p:sldId id="302" r:id="rId14"/>
+    <p:sldId id="303" r:id="rId15"/>
+    <p:sldId id="265" r:id="rId16"/>
+    <p:sldId id="262" r:id="rId17"/>
+    <p:sldId id="276" r:id="rId18"/>
+    <p:sldId id="294" r:id="rId19"/>
+    <p:sldId id="264" r:id="rId20"/>
+    <p:sldId id="285" r:id="rId21"/>
+    <p:sldId id="275" r:id="rId22"/>
   </p:sldIdLst>
   <p:sldSz cx="12192000" cy="6858000"/>
   <p:notesSz cx="6858000" cy="9144000"/>
@@ -270,7 +277,7 @@
       </p15:sldGuideLst>
     </p:ext>
     <p:ext uri="http://customooxmlschemas.google.com/">
-      <go:slidesCustomData xmlns="" xmlns:mc="http://schemas.openxmlformats.org/markup-compatibility/2006" xmlns:mv="urn:schemas-microsoft-com:mac:vml" xmlns:c="http://schemas.openxmlformats.org/drawingml/2006/chart" xmlns:dgm="http://schemas.openxmlformats.org/drawingml/2006/diagram" xmlns:o="urn:schemas-microsoft-com:office:office" xmlns:v="urn:schemas-microsoft-com:vml" xmlns:pvml="urn:schemas-microsoft-com:office:powerpoint" xmlns:com="http://schemas.openxmlformats.org/drawingml/2006/compatibility" xmlns:p14="http://schemas.microsoft.com/office/powerpoint/2010/main" xmlns:p15="http://schemas.microsoft.com/office/powerpoint/2012/main" xmlns:ahyp="http://schemas.microsoft.com/office/drawing/2018/hyperlinkcolor" xmlns:go="http://customooxmlschemas.google.com/" r:id="rId19" roundtripDataSignature="AMtx7mh4AnWqKiKwcfY1PjhpfBTzB0m46g=="/>
+      <go:slidesCustomData xmlns:go="http://customooxmlschemas.google.com/" xmlns:ahyp="http://schemas.microsoft.com/office/drawing/2018/hyperlinkcolor" xmlns:p15="http://schemas.microsoft.com/office/powerpoint/2012/main" xmlns:p14="http://schemas.microsoft.com/office/powerpoint/2010/main" xmlns:com="http://schemas.openxmlformats.org/drawingml/2006/compatibility" xmlns:pvml="urn:schemas-microsoft-com:office:powerpoint" xmlns:v="urn:schemas-microsoft-com:vml" xmlns:o="urn:schemas-microsoft-com:office:office" xmlns:dgm="http://schemas.openxmlformats.org/drawingml/2006/diagram" xmlns:c="http://schemas.openxmlformats.org/drawingml/2006/chart" xmlns:mv="urn:schemas-microsoft-com:mac:vml" xmlns:mc="http://schemas.openxmlformats.org/markup-compatibility/2006" xmlns="" r:id="rId24" roundtripDataSignature="AMtx7mh4AnWqKiKwcfY1PjhpfBTzB0m46g=="/>
     </p:ext>
   </p:extLst>
 </p:presentation>
@@ -19332,6 +19339,1522 @@
   <p:cSld>
     <p:spTree>
       <p:nvGrpSpPr>
+        <p:cNvPr id="1" name=""/>
+        <p:cNvGrpSpPr/>
+        <p:nvPr/>
+      </p:nvGrpSpPr>
+      <p:grpSpPr>
+        <a:xfrm>
+          <a:off x="0" y="0"/>
+          <a:ext cx="0" cy="0"/>
+          <a:chOff x="0" y="0"/>
+          <a:chExt cx="0" cy="0"/>
+        </a:xfrm>
+      </p:grpSpPr>
+      <p:sp>
+        <p:nvSpPr>
+          <p:cNvPr id="2" name="Title 1">
+            <a:extLst>
+              <a:ext uri="{FF2B5EF4-FFF2-40B4-BE49-F238E27FC236}">
+                <a16:creationId xmlns:a16="http://schemas.microsoft.com/office/drawing/2014/main" id="{5BE62DF5-E7DB-7A4B-9BC4-3BE36112080E}"/>
+              </a:ext>
+            </a:extLst>
+          </p:cNvPr>
+          <p:cNvSpPr>
+            <a:spLocks noGrp="1"/>
+          </p:cNvSpPr>
+          <p:nvPr>
+            <p:ph type="title"/>
+          </p:nvPr>
+        </p:nvSpPr>
+        <p:spPr/>
+        <p:txBody>
+          <a:bodyPr/>
+          <a:lstStyle/>
+          <a:p>
+            <a:r>
+              <a:rPr lang="en-US" dirty="0"/>
+              <a:t>Hierarchical Clustering</a:t>
+            </a:r>
+          </a:p>
+        </p:txBody>
+      </p:sp>
+      <p:sp>
+        <p:nvSpPr>
+          <p:cNvPr id="3" name="Text Placeholder 2">
+            <a:extLst>
+              <a:ext uri="{FF2B5EF4-FFF2-40B4-BE49-F238E27FC236}">
+                <a16:creationId xmlns:a16="http://schemas.microsoft.com/office/drawing/2014/main" id="{2DA01AB2-F0DB-324E-8C80-DA316BF90DA3}"/>
+              </a:ext>
+            </a:extLst>
+          </p:cNvPr>
+          <p:cNvSpPr>
+            <a:spLocks noGrp="1"/>
+          </p:cNvSpPr>
+          <p:nvPr>
+            <p:ph type="body" idx="1"/>
+          </p:nvPr>
+        </p:nvSpPr>
+        <p:spPr>
+          <a:xfrm>
+            <a:off x="2579914" y="5380988"/>
+            <a:ext cx="6008914" cy="464640"/>
+          </a:xfrm>
+        </p:spPr>
+        <p:txBody>
+          <a:bodyPr>
+            <a:normAutofit/>
+          </a:bodyPr>
+          <a:lstStyle/>
+          <a:p>
+            <a:pPr marL="95250" indent="0">
+              <a:buNone/>
+            </a:pPr>
+            <a:r>
+              <a:rPr lang="en-US" sz="1000" dirty="0"/>
+              <a:t>James, Witten, Hastie, </a:t>
+            </a:r>
+            <a:r>
+              <a:rPr lang="en-US" sz="1000" dirty="0" err="1"/>
+              <a:t>Tibshirani</a:t>
+            </a:r>
+            <a:r>
+              <a:rPr lang="en-US" sz="1000" dirty="0"/>
+              <a:t>; An Introduction to Statistical Learning; Springer, 2017, Page 393</a:t>
+            </a:r>
+          </a:p>
+        </p:txBody>
+      </p:sp>
+      <p:pic>
+        <p:nvPicPr>
+          <p:cNvPr id="4" name="Picture 3">
+            <a:extLst>
+              <a:ext uri="{FF2B5EF4-FFF2-40B4-BE49-F238E27FC236}">
+                <a16:creationId xmlns:a16="http://schemas.microsoft.com/office/drawing/2014/main" id="{F5ACA78A-0D47-234D-9564-8AB982A1A139}"/>
+              </a:ext>
+            </a:extLst>
+          </p:cNvPr>
+          <p:cNvPicPr>
+            <a:picLocks noChangeAspect="1"/>
+          </p:cNvPicPr>
+          <p:nvPr/>
+        </p:nvPicPr>
+        <p:blipFill>
+          <a:blip r:embed="rId2"/>
+          <a:stretch>
+            <a:fillRect/>
+          </a:stretch>
+        </p:blipFill>
+        <p:spPr>
+          <a:xfrm>
+            <a:off x="2428421" y="2683915"/>
+            <a:ext cx="6311900" cy="2697073"/>
+          </a:xfrm>
+          <a:prstGeom prst="rect">
+            <a:avLst/>
+          </a:prstGeom>
+        </p:spPr>
+      </p:pic>
+      <p:sp>
+        <p:nvSpPr>
+          <p:cNvPr id="5" name="TextBox 4">
+            <a:extLst>
+              <a:ext uri="{FF2B5EF4-FFF2-40B4-BE49-F238E27FC236}">
+                <a16:creationId xmlns:a16="http://schemas.microsoft.com/office/drawing/2014/main" id="{7E24F8A6-E89F-9F4D-8B3C-C0094F3A0D54}"/>
+              </a:ext>
+            </a:extLst>
+          </p:cNvPr>
+          <p:cNvSpPr txBox="1"/>
+          <p:nvPr/>
+        </p:nvSpPr>
+        <p:spPr>
+          <a:xfrm>
+            <a:off x="2928256" y="2219275"/>
+            <a:ext cx="1710725" cy="400110"/>
+          </a:xfrm>
+          <a:prstGeom prst="rect">
+            <a:avLst/>
+          </a:prstGeom>
+          <a:noFill/>
+        </p:spPr>
+        <p:txBody>
+          <a:bodyPr wrap="none" rtlCol="0">
+            <a:spAutoFit/>
+          </a:bodyPr>
+          <a:lstStyle/>
+          <a:p>
+            <a:r>
+              <a:rPr lang="en-US" sz="2000" b="1" dirty="0"/>
+              <a:t>Dendrogram</a:t>
+            </a:r>
+          </a:p>
+        </p:txBody>
+      </p:sp>
+      <p:sp>
+        <p:nvSpPr>
+          <p:cNvPr id="6" name="TextBox 5">
+            <a:extLst>
+              <a:ext uri="{FF2B5EF4-FFF2-40B4-BE49-F238E27FC236}">
+                <a16:creationId xmlns:a16="http://schemas.microsoft.com/office/drawing/2014/main" id="{3BF14A0F-18E0-AF4E-97C9-F955A54F0D71}"/>
+              </a:ext>
+            </a:extLst>
+          </p:cNvPr>
+          <p:cNvSpPr txBox="1"/>
+          <p:nvPr/>
+        </p:nvSpPr>
+        <p:spPr>
+          <a:xfrm>
+            <a:off x="5747656" y="2219275"/>
+            <a:ext cx="2664512" cy="400110"/>
+          </a:xfrm>
+          <a:prstGeom prst="rect">
+            <a:avLst/>
+          </a:prstGeom>
+          <a:noFill/>
+        </p:spPr>
+        <p:txBody>
+          <a:bodyPr wrap="none" rtlCol="0">
+            <a:spAutoFit/>
+          </a:bodyPr>
+          <a:lstStyle/>
+          <a:p>
+            <a:r>
+              <a:rPr lang="en-US" sz="2000" b="1" dirty="0"/>
+              <a:t>Measurement Space</a:t>
+            </a:r>
+          </a:p>
+        </p:txBody>
+      </p:sp>
+    </p:spTree>
+    <p:extLst>
+      <p:ext uri="{BB962C8B-B14F-4D97-AF65-F5344CB8AC3E}">
+        <p14:creationId xmlns:p14="http://schemas.microsoft.com/office/powerpoint/2010/main" val="2566117618"/>
+      </p:ext>
+    </p:extLst>
+  </p:cSld>
+  <p:clrMapOvr>
+    <a:masterClrMapping/>
+  </p:clrMapOvr>
+</p:sld>
+</file>
+
+<file path=ppt/slides/slide11.xml><?xml version="1.0" encoding="utf-8"?>
+<p:sld xmlns:a="http://schemas.openxmlformats.org/drawingml/2006/main" xmlns:r="http://schemas.openxmlformats.org/officeDocument/2006/relationships" xmlns:p="http://schemas.openxmlformats.org/presentationml/2006/main">
+  <p:cSld>
+    <p:spTree>
+      <p:nvGrpSpPr>
+        <p:cNvPr id="1" name=""/>
+        <p:cNvGrpSpPr/>
+        <p:nvPr/>
+      </p:nvGrpSpPr>
+      <p:grpSpPr>
+        <a:xfrm>
+          <a:off x="0" y="0"/>
+          <a:ext cx="0" cy="0"/>
+          <a:chOff x="0" y="0"/>
+          <a:chExt cx="0" cy="0"/>
+        </a:xfrm>
+      </p:grpSpPr>
+      <p:sp>
+        <p:nvSpPr>
+          <p:cNvPr id="2" name="Title 1">
+            <a:extLst>
+              <a:ext uri="{FF2B5EF4-FFF2-40B4-BE49-F238E27FC236}">
+                <a16:creationId xmlns:a16="http://schemas.microsoft.com/office/drawing/2014/main" id="{9B9CBDEA-B6B5-DC4D-886B-CFF42D091AFE}"/>
+              </a:ext>
+            </a:extLst>
+          </p:cNvPr>
+          <p:cNvSpPr>
+            <a:spLocks noGrp="1"/>
+          </p:cNvSpPr>
+          <p:nvPr>
+            <p:ph type="title"/>
+          </p:nvPr>
+        </p:nvSpPr>
+        <p:spPr/>
+        <p:txBody>
+          <a:bodyPr/>
+          <a:lstStyle/>
+          <a:p>
+            <a:r>
+              <a:rPr lang="en-US" dirty="0"/>
+              <a:t>Common Measures of Distance</a:t>
+            </a:r>
+          </a:p>
+        </p:txBody>
+      </p:sp>
+      <p:pic>
+        <p:nvPicPr>
+          <p:cNvPr id="1026" name="Picture 2">
+            <a:extLst>
+              <a:ext uri="{FF2B5EF4-FFF2-40B4-BE49-F238E27FC236}">
+                <a16:creationId xmlns:a16="http://schemas.microsoft.com/office/drawing/2014/main" id="{2FDE4236-E735-CD46-BB49-BD424CB4B7A5}"/>
+              </a:ext>
+            </a:extLst>
+          </p:cNvPr>
+          <p:cNvPicPr>
+            <a:picLocks noChangeAspect="1" noChangeArrowheads="1"/>
+          </p:cNvPicPr>
+          <p:nvPr/>
+        </p:nvPicPr>
+        <p:blipFill>
+          <a:blip r:embed="rId2">
+            <a:extLst>
+              <a:ext uri="{28A0092B-C50C-407E-A947-70E740481C1C}">
+                <a14:useLocalDpi xmlns:a14="http://schemas.microsoft.com/office/drawing/2010/main" val="0"/>
+              </a:ext>
+            </a:extLst>
+          </a:blip>
+          <a:srcRect/>
+          <a:stretch>
+            <a:fillRect/>
+          </a:stretch>
+        </p:blipFill>
+        <p:spPr bwMode="auto">
+          <a:xfrm>
+            <a:off x="4652611" y="2012043"/>
+            <a:ext cx="3045114" cy="2679700"/>
+          </a:xfrm>
+          <a:prstGeom prst="rect">
+            <a:avLst/>
+          </a:prstGeom>
+          <a:noFill/>
+          <a:extLst>
+            <a:ext uri="{909E8E84-426E-40DD-AFC4-6F175D3DCCD1}">
+              <a14:hiddenFill xmlns:a14="http://schemas.microsoft.com/office/drawing/2010/main">
+                <a:solidFill>
+                  <a:srgbClr val="FFFFFF"/>
+                </a:solidFill>
+              </a14:hiddenFill>
+            </a:ext>
+          </a:extLst>
+        </p:spPr>
+      </p:pic>
+      <p:sp>
+        <p:nvSpPr>
+          <p:cNvPr id="4" name="TextBox 3">
+            <a:extLst>
+              <a:ext uri="{FF2B5EF4-FFF2-40B4-BE49-F238E27FC236}">
+                <a16:creationId xmlns:a16="http://schemas.microsoft.com/office/drawing/2014/main" id="{1D025CBD-06DA-1749-8608-907ED495813E}"/>
+              </a:ext>
+            </a:extLst>
+          </p:cNvPr>
+          <p:cNvSpPr txBox="1"/>
+          <p:nvPr/>
+        </p:nvSpPr>
+        <p:spPr>
+          <a:xfrm>
+            <a:off x="5207776" y="4921908"/>
+            <a:ext cx="1872629" cy="738664"/>
+          </a:xfrm>
+          <a:prstGeom prst="rect">
+            <a:avLst/>
+          </a:prstGeom>
+          <a:noFill/>
+        </p:spPr>
+        <p:txBody>
+          <a:bodyPr wrap="none" rtlCol="0">
+            <a:spAutoFit/>
+          </a:bodyPr>
+          <a:lstStyle/>
+          <a:p>
+            <a:r>
+              <a:rPr lang="en-US" b="1" dirty="0"/>
+              <a:t>Manhattan Distance</a:t>
+            </a:r>
+          </a:p>
+          <a:p>
+            <a:pPr lvl="1"/>
+            <a:r>
+              <a:rPr lang="en-US" dirty="0"/>
+              <a:t>City Blocks</a:t>
+            </a:r>
+          </a:p>
+          <a:p>
+            <a:endParaRPr lang="en-US" dirty="0"/>
+          </a:p>
+        </p:txBody>
+      </p:sp>
+      <p:sp>
+        <p:nvSpPr>
+          <p:cNvPr id="5" name="TextBox 4">
+            <a:extLst>
+              <a:ext uri="{FF2B5EF4-FFF2-40B4-BE49-F238E27FC236}">
+                <a16:creationId xmlns:a16="http://schemas.microsoft.com/office/drawing/2014/main" id="{51C56135-F954-5D41-BA86-8D3143976385}"/>
+              </a:ext>
+            </a:extLst>
+          </p:cNvPr>
+          <p:cNvSpPr txBox="1"/>
+          <p:nvPr/>
+        </p:nvSpPr>
+        <p:spPr>
+          <a:xfrm>
+            <a:off x="544285" y="4921908"/>
+            <a:ext cx="1824538" cy="738664"/>
+          </a:xfrm>
+          <a:prstGeom prst="rect">
+            <a:avLst/>
+          </a:prstGeom>
+          <a:noFill/>
+        </p:spPr>
+        <p:txBody>
+          <a:bodyPr wrap="none" rtlCol="0">
+            <a:spAutoFit/>
+          </a:bodyPr>
+          <a:lstStyle/>
+          <a:p>
+            <a:r>
+              <a:rPr lang="en-US" b="1" dirty="0"/>
+              <a:t>Euclidean Distance</a:t>
+            </a:r>
+          </a:p>
+          <a:p>
+            <a:pPr lvl="1"/>
+            <a:r>
+              <a:rPr lang="en-US" dirty="0"/>
+              <a:t>Straight Line</a:t>
+            </a:r>
+          </a:p>
+          <a:p>
+            <a:endParaRPr lang="en-US" dirty="0"/>
+          </a:p>
+        </p:txBody>
+      </p:sp>
+      <p:sp>
+        <p:nvSpPr>
+          <p:cNvPr id="6" name="TextBox 5">
+            <a:extLst>
+              <a:ext uri="{FF2B5EF4-FFF2-40B4-BE49-F238E27FC236}">
+                <a16:creationId xmlns:a16="http://schemas.microsoft.com/office/drawing/2014/main" id="{2574F902-FAEB-DF4B-906E-8ABDD8C728DB}"/>
+              </a:ext>
+            </a:extLst>
+          </p:cNvPr>
+          <p:cNvSpPr txBox="1"/>
+          <p:nvPr/>
+        </p:nvSpPr>
+        <p:spPr>
+          <a:xfrm>
+            <a:off x="9187543" y="4832475"/>
+            <a:ext cx="1576072" cy="523220"/>
+          </a:xfrm>
+          <a:prstGeom prst="rect">
+            <a:avLst/>
+          </a:prstGeom>
+          <a:noFill/>
+        </p:spPr>
+        <p:txBody>
+          <a:bodyPr wrap="none" rtlCol="0">
+            <a:spAutoFit/>
+          </a:bodyPr>
+          <a:lstStyle/>
+          <a:p>
+            <a:r>
+              <a:rPr lang="en-US" b="1" dirty="0"/>
+              <a:t>Cosine Distance</a:t>
+            </a:r>
+          </a:p>
+          <a:p>
+            <a:pPr lvl="1"/>
+            <a:r>
+              <a:rPr lang="en-US" dirty="0"/>
+              <a:t>Angular Distance</a:t>
+            </a:r>
+          </a:p>
+        </p:txBody>
+      </p:sp>
+      <p:pic>
+        <p:nvPicPr>
+          <p:cNvPr id="1028" name="Picture 4">
+            <a:extLst>
+              <a:ext uri="{FF2B5EF4-FFF2-40B4-BE49-F238E27FC236}">
+                <a16:creationId xmlns:a16="http://schemas.microsoft.com/office/drawing/2014/main" id="{6D3268BA-118B-1542-8609-08D51E71E619}"/>
+              </a:ext>
+            </a:extLst>
+          </p:cNvPr>
+          <p:cNvPicPr>
+            <a:picLocks noChangeAspect="1" noChangeArrowheads="1"/>
+          </p:cNvPicPr>
+          <p:nvPr/>
+        </p:nvPicPr>
+        <p:blipFill>
+          <a:blip r:embed="rId3">
+            <a:extLst>
+              <a:ext uri="{28A0092B-C50C-407E-A947-70E740481C1C}">
+                <a14:useLocalDpi xmlns:a14="http://schemas.microsoft.com/office/drawing/2010/main" val="0"/>
+              </a:ext>
+            </a:extLst>
+          </a:blip>
+          <a:srcRect/>
+          <a:stretch>
+            <a:fillRect/>
+          </a:stretch>
+        </p:blipFill>
+        <p:spPr bwMode="auto">
+          <a:xfrm>
+            <a:off x="5301521" y="5660572"/>
+            <a:ext cx="1778884" cy="415684"/>
+          </a:xfrm>
+          <a:prstGeom prst="rect">
+            <a:avLst/>
+          </a:prstGeom>
+          <a:noFill/>
+          <a:extLst>
+            <a:ext uri="{909E8E84-426E-40DD-AFC4-6F175D3DCCD1}">
+              <a14:hiddenFill xmlns:a14="http://schemas.microsoft.com/office/drawing/2010/main">
+                <a:solidFill>
+                  <a:srgbClr val="FFFFFF"/>
+                </a:solidFill>
+              </a14:hiddenFill>
+            </a:ext>
+          </a:extLst>
+        </p:spPr>
+      </p:pic>
+      <p:sp>
+        <p:nvSpPr>
+          <p:cNvPr id="7" name="TextBox 6">
+            <a:extLst>
+              <a:ext uri="{FF2B5EF4-FFF2-40B4-BE49-F238E27FC236}">
+                <a16:creationId xmlns:a16="http://schemas.microsoft.com/office/drawing/2014/main" id="{E427E50E-11AB-A941-AAA9-67368B1E6E84}"/>
+              </a:ext>
+            </a:extLst>
+          </p:cNvPr>
+          <p:cNvSpPr txBox="1"/>
+          <p:nvPr/>
+        </p:nvSpPr>
+        <p:spPr>
+          <a:xfrm>
+            <a:off x="2597245" y="6477000"/>
+            <a:ext cx="6824304" cy="307777"/>
+          </a:xfrm>
+          <a:prstGeom prst="rect">
+            <a:avLst/>
+          </a:prstGeom>
+          <a:noFill/>
+        </p:spPr>
+        <p:txBody>
+          <a:bodyPr wrap="none" rtlCol="0">
+            <a:spAutoFit/>
+          </a:bodyPr>
+          <a:lstStyle/>
+          <a:p>
+            <a:r>
+              <a:rPr lang="en-US" dirty="0"/>
+              <a:t>https://</a:t>
+            </a:r>
+            <a:r>
+              <a:rPr lang="en-US" dirty="0" err="1"/>
+              <a:t>montjoile.medium.com</a:t>
+            </a:r>
+            <a:r>
+              <a:rPr lang="en-US" dirty="0"/>
+              <a:t>/l0-norm-l1-norm-l2-norm-l-infinity-norm-7a7d18a4f40c</a:t>
+            </a:r>
+          </a:p>
+        </p:txBody>
+      </p:sp>
+      <p:pic>
+        <p:nvPicPr>
+          <p:cNvPr id="1030" name="Picture 6">
+            <a:extLst>
+              <a:ext uri="{FF2B5EF4-FFF2-40B4-BE49-F238E27FC236}">
+                <a16:creationId xmlns:a16="http://schemas.microsoft.com/office/drawing/2014/main" id="{5CEE146F-DD20-E34E-9B28-084E74406122}"/>
+              </a:ext>
+            </a:extLst>
+          </p:cNvPr>
+          <p:cNvPicPr>
+            <a:picLocks noChangeAspect="1" noChangeArrowheads="1"/>
+          </p:cNvPicPr>
+          <p:nvPr/>
+        </p:nvPicPr>
+        <p:blipFill>
+          <a:blip r:embed="rId4">
+            <a:extLst>
+              <a:ext uri="{28A0092B-C50C-407E-A947-70E740481C1C}">
+                <a14:useLocalDpi xmlns:a14="http://schemas.microsoft.com/office/drawing/2010/main" val="0"/>
+              </a:ext>
+            </a:extLst>
+          </a:blip>
+          <a:srcRect/>
+          <a:stretch>
+            <a:fillRect/>
+          </a:stretch>
+        </p:blipFill>
+        <p:spPr bwMode="auto">
+          <a:xfrm>
+            <a:off x="435429" y="2012043"/>
+            <a:ext cx="2716479" cy="1973975"/>
+          </a:xfrm>
+          <a:prstGeom prst="rect">
+            <a:avLst/>
+          </a:prstGeom>
+          <a:noFill/>
+          <a:extLst>
+            <a:ext uri="{909E8E84-426E-40DD-AFC4-6F175D3DCCD1}">
+              <a14:hiddenFill xmlns:a14="http://schemas.microsoft.com/office/drawing/2010/main">
+                <a:solidFill>
+                  <a:srgbClr val="FFFFFF"/>
+                </a:solidFill>
+              </a14:hiddenFill>
+            </a:ext>
+          </a:extLst>
+        </p:spPr>
+      </p:pic>
+      <p:pic>
+        <p:nvPicPr>
+          <p:cNvPr id="1032" name="Picture 8">
+            <a:extLst>
+              <a:ext uri="{FF2B5EF4-FFF2-40B4-BE49-F238E27FC236}">
+                <a16:creationId xmlns:a16="http://schemas.microsoft.com/office/drawing/2014/main" id="{0C603FC8-D975-4947-8F60-53A7679E4ED3}"/>
+              </a:ext>
+            </a:extLst>
+          </p:cNvPr>
+          <p:cNvPicPr>
+            <a:picLocks noChangeAspect="1" noChangeArrowheads="1"/>
+          </p:cNvPicPr>
+          <p:nvPr/>
+        </p:nvPicPr>
+        <p:blipFill>
+          <a:blip r:embed="rId5">
+            <a:extLst>
+              <a:ext uri="{28A0092B-C50C-407E-A947-70E740481C1C}">
+                <a14:useLocalDpi xmlns:a14="http://schemas.microsoft.com/office/drawing/2010/main" val="0"/>
+              </a:ext>
+            </a:extLst>
+          </a:blip>
+          <a:srcRect/>
+          <a:stretch>
+            <a:fillRect/>
+          </a:stretch>
+        </p:blipFill>
+        <p:spPr bwMode="auto">
+          <a:xfrm>
+            <a:off x="435429" y="5766467"/>
+            <a:ext cx="2860213" cy="307778"/>
+          </a:xfrm>
+          <a:prstGeom prst="rect">
+            <a:avLst/>
+          </a:prstGeom>
+          <a:noFill/>
+          <a:extLst>
+            <a:ext uri="{909E8E84-426E-40DD-AFC4-6F175D3DCCD1}">
+              <a14:hiddenFill xmlns:a14="http://schemas.microsoft.com/office/drawing/2010/main">
+                <a:solidFill>
+                  <a:srgbClr val="FFFFFF"/>
+                </a:solidFill>
+              </a14:hiddenFill>
+            </a:ext>
+          </a:extLst>
+        </p:spPr>
+      </p:pic>
+      <p:pic>
+        <p:nvPicPr>
+          <p:cNvPr id="1034" name="Picture 10" descr="Euclidean vs. Cosine Distance">
+            <a:extLst>
+              <a:ext uri="{FF2B5EF4-FFF2-40B4-BE49-F238E27FC236}">
+                <a16:creationId xmlns:a16="http://schemas.microsoft.com/office/drawing/2014/main" id="{61BE4FAC-E00F-FA4F-8307-0D499E8E0D42}"/>
+              </a:ext>
+            </a:extLst>
+          </p:cNvPr>
+          <p:cNvPicPr>
+            <a:picLocks noChangeAspect="1" noChangeArrowheads="1"/>
+          </p:cNvPicPr>
+          <p:nvPr/>
+        </p:nvPicPr>
+        <p:blipFill>
+          <a:blip r:embed="rId6">
+            <a:extLst>
+              <a:ext uri="{28A0092B-C50C-407E-A947-70E740481C1C}">
+                <a14:useLocalDpi xmlns:a14="http://schemas.microsoft.com/office/drawing/2010/main" val="0"/>
+              </a:ext>
+            </a:extLst>
+          </a:blip>
+          <a:srcRect/>
+          <a:stretch>
+            <a:fillRect/>
+          </a:stretch>
+        </p:blipFill>
+        <p:spPr bwMode="auto">
+          <a:xfrm>
+            <a:off x="9011275" y="2275113"/>
+            <a:ext cx="2201639" cy="1422111"/>
+          </a:xfrm>
+          <a:prstGeom prst="rect">
+            <a:avLst/>
+          </a:prstGeom>
+          <a:noFill/>
+          <a:extLst>
+            <a:ext uri="{909E8E84-426E-40DD-AFC4-6F175D3DCCD1}">
+              <a14:hiddenFill xmlns:a14="http://schemas.microsoft.com/office/drawing/2010/main">
+                <a:solidFill>
+                  <a:srgbClr val="FFFFFF"/>
+                </a:solidFill>
+              </a14:hiddenFill>
+            </a:ext>
+          </a:extLst>
+        </p:spPr>
+      </p:pic>
+    </p:spTree>
+    <p:extLst>
+      <p:ext uri="{BB962C8B-B14F-4D97-AF65-F5344CB8AC3E}">
+        <p14:creationId xmlns:p14="http://schemas.microsoft.com/office/powerpoint/2010/main" val="1955050151"/>
+      </p:ext>
+    </p:extLst>
+  </p:cSld>
+  <p:clrMapOvr>
+    <a:masterClrMapping/>
+  </p:clrMapOvr>
+</p:sld>
+</file>
+
+<file path=ppt/slides/slide12.xml><?xml version="1.0" encoding="utf-8"?>
+<p:sld xmlns:a="http://schemas.openxmlformats.org/drawingml/2006/main" xmlns:r="http://schemas.openxmlformats.org/officeDocument/2006/relationships" xmlns:p="http://schemas.openxmlformats.org/presentationml/2006/main">
+  <p:cSld>
+    <p:spTree>
+      <p:nvGrpSpPr>
+        <p:cNvPr id="1" name=""/>
+        <p:cNvGrpSpPr/>
+        <p:nvPr/>
+      </p:nvGrpSpPr>
+      <p:grpSpPr>
+        <a:xfrm>
+          <a:off x="0" y="0"/>
+          <a:ext cx="0" cy="0"/>
+          <a:chOff x="0" y="0"/>
+          <a:chExt cx="0" cy="0"/>
+        </a:xfrm>
+      </p:grpSpPr>
+      <p:sp>
+        <p:nvSpPr>
+          <p:cNvPr id="2" name="Title 1">
+            <a:extLst>
+              <a:ext uri="{FF2B5EF4-FFF2-40B4-BE49-F238E27FC236}">
+                <a16:creationId xmlns:a16="http://schemas.microsoft.com/office/drawing/2014/main" id="{3D42A5E5-4DA3-BC4F-8668-00295A264F77}"/>
+              </a:ext>
+            </a:extLst>
+          </p:cNvPr>
+          <p:cNvSpPr>
+            <a:spLocks noGrp="1"/>
+          </p:cNvSpPr>
+          <p:nvPr>
+            <p:ph type="title"/>
+          </p:nvPr>
+        </p:nvSpPr>
+        <p:spPr/>
+        <p:txBody>
+          <a:bodyPr/>
+          <a:lstStyle/>
+          <a:p>
+            <a:r>
+              <a:rPr lang="en-US" dirty="0"/>
+              <a:t>Linkage</a:t>
+            </a:r>
+          </a:p>
+        </p:txBody>
+      </p:sp>
+      <p:sp>
+        <p:nvSpPr>
+          <p:cNvPr id="3" name="Text Placeholder 2">
+            <a:extLst>
+              <a:ext uri="{FF2B5EF4-FFF2-40B4-BE49-F238E27FC236}">
+                <a16:creationId xmlns:a16="http://schemas.microsoft.com/office/drawing/2014/main" id="{27987EC7-CEEB-EB42-9748-8A0E1E878EE7}"/>
+              </a:ext>
+            </a:extLst>
+          </p:cNvPr>
+          <p:cNvSpPr>
+            <a:spLocks noGrp="1"/>
+          </p:cNvSpPr>
+          <p:nvPr>
+            <p:ph type="body" idx="1"/>
+          </p:nvPr>
+        </p:nvSpPr>
+        <p:spPr>
+          <a:xfrm>
+            <a:off x="838200" y="1692001"/>
+            <a:ext cx="5763212" cy="4351338"/>
+          </a:xfrm>
+        </p:spPr>
+        <p:txBody>
+          <a:bodyPr>
+            <a:normAutofit lnSpcReduction="10000"/>
+          </a:bodyPr>
+          <a:lstStyle/>
+          <a:p>
+            <a:pPr marL="95250" indent="0">
+              <a:buNone/>
+            </a:pPr>
+            <a:r>
+              <a:rPr lang="en-US" dirty="0"/>
+              <a:t>Distance between groups of observations</a:t>
+            </a:r>
+          </a:p>
+          <a:p>
+            <a:pPr marL="95250" indent="0">
+              <a:buNone/>
+            </a:pPr>
+            <a:endParaRPr lang="en-US" b="1" dirty="0"/>
+          </a:p>
+          <a:p>
+            <a:pPr marL="95250" indent="0">
+              <a:buNone/>
+            </a:pPr>
+            <a:r>
+              <a:rPr lang="en-US" b="1" dirty="0"/>
+              <a:t>Ward</a:t>
+            </a:r>
+          </a:p>
+          <a:p>
+            <a:pPr lvl="1"/>
+            <a:r>
+              <a:rPr lang="en-US" dirty="0"/>
+              <a:t>Minimize sum of squared differences within clusters</a:t>
+            </a:r>
+          </a:p>
+          <a:p>
+            <a:pPr marL="95250" indent="0">
+              <a:buNone/>
+            </a:pPr>
+            <a:r>
+              <a:rPr lang="en-US" b="1" dirty="0"/>
+              <a:t>Complete</a:t>
+            </a:r>
+          </a:p>
+          <a:p>
+            <a:pPr lvl="1"/>
+            <a:r>
+              <a:rPr lang="en-US" dirty="0"/>
+              <a:t>Minimize maximum of distances between pairs</a:t>
+            </a:r>
+          </a:p>
+          <a:p>
+            <a:pPr marL="95250" indent="0">
+              <a:buNone/>
+            </a:pPr>
+            <a:r>
+              <a:rPr lang="en-US" b="1" dirty="0"/>
+              <a:t>Average</a:t>
+            </a:r>
+          </a:p>
+          <a:p>
+            <a:pPr lvl="1"/>
+            <a:r>
+              <a:rPr lang="en-US" dirty="0"/>
+              <a:t>Minimize average of distances between all points</a:t>
+            </a:r>
+          </a:p>
+          <a:p>
+            <a:pPr marL="95250" indent="0">
+              <a:buNone/>
+            </a:pPr>
+            <a:r>
+              <a:rPr lang="en-US" b="1" dirty="0"/>
+              <a:t>Single</a:t>
+            </a:r>
+          </a:p>
+          <a:p>
+            <a:pPr lvl="1"/>
+            <a:r>
+              <a:rPr lang="en-US" dirty="0"/>
+              <a:t>Minimize distance between closest observations from a pair of clusters</a:t>
+            </a:r>
+          </a:p>
+        </p:txBody>
+      </p:sp>
+      <p:pic>
+        <p:nvPicPr>
+          <p:cNvPr id="5" name="Picture 4">
+            <a:extLst>
+              <a:ext uri="{FF2B5EF4-FFF2-40B4-BE49-F238E27FC236}">
+                <a16:creationId xmlns:a16="http://schemas.microsoft.com/office/drawing/2014/main" id="{ADA1E28B-BEEE-664D-AD17-6993C9B194AE}"/>
+              </a:ext>
+            </a:extLst>
+          </p:cNvPr>
+          <p:cNvPicPr>
+            <a:picLocks noChangeAspect="1"/>
+          </p:cNvPicPr>
+          <p:nvPr/>
+        </p:nvPicPr>
+        <p:blipFill>
+          <a:blip r:embed="rId2"/>
+          <a:stretch>
+            <a:fillRect/>
+          </a:stretch>
+        </p:blipFill>
+        <p:spPr>
+          <a:xfrm>
+            <a:off x="6601412" y="1522139"/>
+            <a:ext cx="4306925" cy="4521200"/>
+          </a:xfrm>
+          <a:prstGeom prst="rect">
+            <a:avLst/>
+          </a:prstGeom>
+        </p:spPr>
+      </p:pic>
+    </p:spTree>
+    <p:extLst>
+      <p:ext uri="{BB962C8B-B14F-4D97-AF65-F5344CB8AC3E}">
+        <p14:creationId xmlns:p14="http://schemas.microsoft.com/office/powerpoint/2010/main" val="1850125123"/>
+      </p:ext>
+    </p:extLst>
+  </p:cSld>
+  <p:clrMapOvr>
+    <a:masterClrMapping/>
+  </p:clrMapOvr>
+</p:sld>
+</file>
+
+<file path=ppt/slides/slide13.xml><?xml version="1.0" encoding="utf-8"?>
+<p:sld xmlns:a="http://schemas.openxmlformats.org/drawingml/2006/main" xmlns:r="http://schemas.openxmlformats.org/officeDocument/2006/relationships" xmlns:p="http://schemas.openxmlformats.org/presentationml/2006/main">
+  <p:cSld>
+    <p:spTree>
+      <p:nvGrpSpPr>
+        <p:cNvPr id="1" name=""/>
+        <p:cNvGrpSpPr/>
+        <p:nvPr/>
+      </p:nvGrpSpPr>
+      <p:grpSpPr>
+        <a:xfrm>
+          <a:off x="0" y="0"/>
+          <a:ext cx="0" cy="0"/>
+          <a:chOff x="0" y="0"/>
+          <a:chExt cx="0" cy="0"/>
+        </a:xfrm>
+      </p:grpSpPr>
+      <p:sp>
+        <p:nvSpPr>
+          <p:cNvPr id="2" name="Title 1">
+            <a:extLst>
+              <a:ext uri="{FF2B5EF4-FFF2-40B4-BE49-F238E27FC236}">
+                <a16:creationId xmlns:a16="http://schemas.microsoft.com/office/drawing/2014/main" id="{A0313D30-F6E5-FA43-BB7C-B040F38383BF}"/>
+              </a:ext>
+            </a:extLst>
+          </p:cNvPr>
+          <p:cNvSpPr>
+            <a:spLocks noGrp="1"/>
+          </p:cNvSpPr>
+          <p:nvPr>
+            <p:ph type="title"/>
+          </p:nvPr>
+        </p:nvSpPr>
+        <p:spPr/>
+        <p:txBody>
+          <a:bodyPr/>
+          <a:lstStyle/>
+          <a:p>
+            <a:r>
+              <a:rPr lang="en-US" dirty="0"/>
+              <a:t>Assessment</a:t>
+            </a:r>
+          </a:p>
+        </p:txBody>
+      </p:sp>
+      <p:sp>
+        <p:nvSpPr>
+          <p:cNvPr id="3" name="Text Placeholder 2">
+            <a:extLst>
+              <a:ext uri="{FF2B5EF4-FFF2-40B4-BE49-F238E27FC236}">
+                <a16:creationId xmlns:a16="http://schemas.microsoft.com/office/drawing/2014/main" id="{A88B63A2-81A8-C74E-8AB8-3D9481319091}"/>
+              </a:ext>
+            </a:extLst>
+          </p:cNvPr>
+          <p:cNvSpPr>
+            <a:spLocks noGrp="1"/>
+          </p:cNvSpPr>
+          <p:nvPr>
+            <p:ph type="body" idx="1"/>
+          </p:nvPr>
+        </p:nvSpPr>
+        <p:spPr/>
+        <p:txBody>
+          <a:bodyPr/>
+          <a:lstStyle/>
+          <a:p>
+            <a:pPr marL="95250" indent="0">
+              <a:buNone/>
+            </a:pPr>
+            <a:r>
+              <a:rPr lang="en-US" b="1" i="1" dirty="0"/>
+              <a:t>Measures To Be Used with Labeled Data</a:t>
+            </a:r>
+          </a:p>
+          <a:p>
+            <a:endParaRPr lang="en-US" dirty="0"/>
+          </a:p>
+          <a:p>
+            <a:r>
+              <a:rPr lang="en-US" dirty="0"/>
+              <a:t>Homogeneity</a:t>
+            </a:r>
+          </a:p>
+          <a:p>
+            <a:pPr lvl="1"/>
+            <a:r>
+              <a:rPr lang="en-US" dirty="0"/>
+              <a:t>Within Cluster Accuracy</a:t>
+            </a:r>
+          </a:p>
+          <a:p>
+            <a:pPr lvl="1"/>
+            <a:r>
+              <a:rPr lang="en-US" dirty="0"/>
+              <a:t>Similar to Precision</a:t>
+            </a:r>
+          </a:p>
+          <a:p>
+            <a:pPr lvl="1"/>
+            <a:r>
+              <a:rPr lang="en-US" dirty="0"/>
+              <a:t>Value between 0 and 1</a:t>
+            </a:r>
+          </a:p>
+          <a:p>
+            <a:r>
+              <a:rPr lang="en-US" dirty="0"/>
+              <a:t>Completeness</a:t>
+            </a:r>
+          </a:p>
+          <a:p>
+            <a:pPr lvl="1"/>
+            <a:r>
+              <a:rPr lang="en-US" dirty="0"/>
+              <a:t>All members of a class should be within the same cluster</a:t>
+            </a:r>
+          </a:p>
+          <a:p>
+            <a:r>
+              <a:rPr lang="en-US" dirty="0"/>
+              <a:t>V-Measure</a:t>
+            </a:r>
+          </a:p>
+          <a:p>
+            <a:pPr lvl="1"/>
+            <a:r>
+              <a:rPr lang="en-US" dirty="0"/>
+              <a:t>Harmonic Mean of the two</a:t>
+            </a:r>
+          </a:p>
+        </p:txBody>
+      </p:sp>
+    </p:spTree>
+    <p:extLst>
+      <p:ext uri="{BB962C8B-B14F-4D97-AF65-F5344CB8AC3E}">
+        <p14:creationId xmlns:p14="http://schemas.microsoft.com/office/powerpoint/2010/main" val="2882387593"/>
+      </p:ext>
+    </p:extLst>
+  </p:cSld>
+  <p:clrMapOvr>
+    <a:masterClrMapping/>
+  </p:clrMapOvr>
+</p:sld>
+</file>
+
+<file path=ppt/slides/slide14.xml><?xml version="1.0" encoding="utf-8"?>
+<p:sld xmlns:a="http://schemas.openxmlformats.org/drawingml/2006/main" xmlns:r="http://schemas.openxmlformats.org/officeDocument/2006/relationships" xmlns:p="http://schemas.openxmlformats.org/presentationml/2006/main">
+  <p:cSld>
+    <p:spTree>
+      <p:nvGrpSpPr>
+        <p:cNvPr id="1" name=""/>
+        <p:cNvGrpSpPr/>
+        <p:nvPr/>
+      </p:nvGrpSpPr>
+      <p:grpSpPr>
+        <a:xfrm>
+          <a:off x="0" y="0"/>
+          <a:ext cx="0" cy="0"/>
+          <a:chOff x="0" y="0"/>
+          <a:chExt cx="0" cy="0"/>
+        </a:xfrm>
+      </p:grpSpPr>
+      <p:sp>
+        <p:nvSpPr>
+          <p:cNvPr id="2" name="Title 1">
+            <a:extLst>
+              <a:ext uri="{FF2B5EF4-FFF2-40B4-BE49-F238E27FC236}">
+                <a16:creationId xmlns:a16="http://schemas.microsoft.com/office/drawing/2014/main" id="{113D7BD8-5A70-1344-8410-BA8186B17DC5}"/>
+              </a:ext>
+            </a:extLst>
+          </p:cNvPr>
+          <p:cNvSpPr>
+            <a:spLocks noGrp="1"/>
+          </p:cNvSpPr>
+          <p:nvPr>
+            <p:ph type="title"/>
+          </p:nvPr>
+        </p:nvSpPr>
+        <p:spPr/>
+        <p:txBody>
+          <a:bodyPr/>
+          <a:lstStyle/>
+          <a:p>
+            <a:r>
+              <a:rPr lang="en-US" dirty="0"/>
+              <a:t>Assessment</a:t>
+            </a:r>
+          </a:p>
+        </p:txBody>
+      </p:sp>
+      <p:sp>
+        <p:nvSpPr>
+          <p:cNvPr id="3" name="Text Placeholder 2">
+            <a:extLst>
+              <a:ext uri="{FF2B5EF4-FFF2-40B4-BE49-F238E27FC236}">
+                <a16:creationId xmlns:a16="http://schemas.microsoft.com/office/drawing/2014/main" id="{79A45132-F534-C643-92D6-1C090C9309C0}"/>
+              </a:ext>
+            </a:extLst>
+          </p:cNvPr>
+          <p:cNvSpPr>
+            <a:spLocks noGrp="1"/>
+          </p:cNvSpPr>
+          <p:nvPr>
+            <p:ph type="body" idx="1"/>
+          </p:nvPr>
+        </p:nvSpPr>
+        <p:spPr/>
+        <p:txBody>
+          <a:bodyPr/>
+          <a:lstStyle/>
+          <a:p>
+            <a:pPr marL="95250" indent="0">
+              <a:buNone/>
+            </a:pPr>
+            <a:r>
+              <a:rPr lang="en-US" b="1" dirty="0"/>
+              <a:t>Without Labeled Data</a:t>
+            </a:r>
+          </a:p>
+          <a:p>
+            <a:endParaRPr lang="en-US" dirty="0"/>
+          </a:p>
+          <a:p>
+            <a:r>
+              <a:rPr lang="en-US" dirty="0"/>
+              <a:t>Silhouette Score</a:t>
+            </a:r>
+          </a:p>
+          <a:p>
+            <a:pPr lvl="1"/>
+            <a:r>
+              <a:rPr lang="en-US" dirty="0"/>
+              <a:t>b(</a:t>
+            </a:r>
+            <a:r>
+              <a:rPr lang="en-US" dirty="0" err="1"/>
+              <a:t>i</a:t>
+            </a:r>
+            <a:r>
+              <a:rPr lang="en-US" dirty="0"/>
+              <a:t>) is the distance between clusters</a:t>
+            </a:r>
+          </a:p>
+          <a:p>
+            <a:pPr lvl="1"/>
+            <a:r>
+              <a:rPr lang="en-US" dirty="0"/>
+              <a:t>a(</a:t>
+            </a:r>
+            <a:r>
+              <a:rPr lang="en-US" dirty="0" err="1"/>
+              <a:t>i</a:t>
+            </a:r>
+            <a:r>
+              <a:rPr lang="en-US" dirty="0"/>
+              <a:t>) is the distance within clusters</a:t>
+            </a:r>
+          </a:p>
+        </p:txBody>
+      </p:sp>
+      <p:pic>
+        <p:nvPicPr>
+          <p:cNvPr id="5" name="Picture 4">
+            <a:extLst>
+              <a:ext uri="{FF2B5EF4-FFF2-40B4-BE49-F238E27FC236}">
+                <a16:creationId xmlns:a16="http://schemas.microsoft.com/office/drawing/2014/main" id="{CA1F976E-E99E-8745-B750-4A5F5A7FAFE1}"/>
+              </a:ext>
+            </a:extLst>
+          </p:cNvPr>
+          <p:cNvPicPr>
+            <a:picLocks noChangeAspect="1"/>
+          </p:cNvPicPr>
+          <p:nvPr/>
+        </p:nvPicPr>
+        <p:blipFill rotWithShape="1">
+          <a:blip r:embed="rId2"/>
+          <a:srcRect r="34870"/>
+          <a:stretch/>
+        </p:blipFill>
+        <p:spPr>
+          <a:xfrm>
+            <a:off x="1968500" y="4073799"/>
+            <a:ext cx="2870200" cy="1092200"/>
+          </a:xfrm>
+          <a:prstGeom prst="rect">
+            <a:avLst/>
+          </a:prstGeom>
+        </p:spPr>
+      </p:pic>
+    </p:spTree>
+    <p:extLst>
+      <p:ext uri="{BB962C8B-B14F-4D97-AF65-F5344CB8AC3E}">
+        <p14:creationId xmlns:p14="http://schemas.microsoft.com/office/powerpoint/2010/main" val="2360819511"/>
+      </p:ext>
+    </p:extLst>
+  </p:cSld>
+  <p:clrMapOvr>
+    <a:masterClrMapping/>
+  </p:clrMapOvr>
+</p:sld>
+</file>
+
+<file path=ppt/slides/slide15.xml><?xml version="1.0" encoding="utf-8"?>
+<p:sld xmlns:a="http://schemas.openxmlformats.org/drawingml/2006/main" xmlns:r="http://schemas.openxmlformats.org/officeDocument/2006/relationships" xmlns:p="http://schemas.openxmlformats.org/presentationml/2006/main">
+  <p:cSld>
+    <p:spTree>
+      <p:nvGrpSpPr>
+        <p:cNvPr id="1" name="Shape 269"/>
+        <p:cNvGrpSpPr/>
+        <p:nvPr/>
+      </p:nvGrpSpPr>
+      <p:grpSpPr>
+        <a:xfrm>
+          <a:off x="0" y="0"/>
+          <a:ext cx="0" cy="0"/>
+          <a:chOff x="0" y="0"/>
+          <a:chExt cx="0" cy="0"/>
+        </a:xfrm>
+      </p:grpSpPr>
+      <p:pic>
+        <p:nvPicPr>
+          <p:cNvPr id="270" name="Google Shape;270;p33"/>
+          <p:cNvPicPr preferRelativeResize="0"/>
+          <p:nvPr/>
+        </p:nvPicPr>
+        <p:blipFill rotWithShape="1">
+          <a:blip r:embed="rId3">
+            <a:alphaModFix/>
+          </a:blip>
+          <a:srcRect/>
+          <a:stretch/>
+        </p:blipFill>
+        <p:spPr>
+          <a:xfrm>
+            <a:off x="-1" y="0"/>
+            <a:ext cx="12192001" cy="6925056"/>
+          </a:xfrm>
+          <a:prstGeom prst="rect">
+            <a:avLst/>
+          </a:prstGeom>
+          <a:noFill/>
+          <a:ln>
+            <a:noFill/>
+          </a:ln>
+        </p:spPr>
+      </p:pic>
+      <p:sp>
+        <p:nvSpPr>
+          <p:cNvPr id="271" name="Google Shape;271;p33"/>
+          <p:cNvSpPr txBox="1">
+            <a:spLocks noGrp="1"/>
+          </p:cNvSpPr>
+          <p:nvPr>
+            <p:ph type="title"/>
+          </p:nvPr>
+        </p:nvSpPr>
+        <p:spPr>
+          <a:xfrm>
+            <a:off x="831851" y="1709742"/>
+            <a:ext cx="10515600" cy="2852737"/>
+          </a:xfrm>
+          <a:prstGeom prst="rect">
+            <a:avLst/>
+          </a:prstGeom>
+          <a:noFill/>
+          <a:ln>
+            <a:noFill/>
+          </a:ln>
+        </p:spPr>
+        <p:txBody>
+          <a:bodyPr spcFirstLastPara="1" wrap="square" lIns="91425" tIns="45700" rIns="91425" bIns="45700" anchor="b" anchorCtr="0">
+            <a:normAutofit/>
+          </a:bodyPr>
+          <a:lstStyle/>
+          <a:p>
+            <a:pPr marL="0" lvl="0" indent="0" algn="l" rtl="0">
+              <a:lnSpc>
+                <a:spcPct val="90000"/>
+              </a:lnSpc>
+              <a:spcBef>
+                <a:spcPts val="0"/>
+              </a:spcBef>
+              <a:spcAft>
+                <a:spcPts val="0"/>
+              </a:spcAft>
+              <a:buClr>
+                <a:schemeClr val="dk1"/>
+              </a:buClr>
+              <a:buSzPts val="4500"/>
+              <a:buFont typeface="Arial"/>
+              <a:buNone/>
+            </a:pPr>
+            <a:r>
+              <a:rPr lang="en-US" sz="4500" b="0" i="0" u="none" strike="noStrike" cap="none" dirty="0">
+                <a:solidFill>
+                  <a:schemeClr val="dk1"/>
+                </a:solidFill>
+                <a:latin typeface="Arial"/>
+                <a:ea typeface="Arial"/>
+                <a:cs typeface="Arial"/>
+                <a:sym typeface="Arial"/>
+              </a:rPr>
+              <a:t>Project Deliverables</a:t>
+            </a:r>
+            <a:endParaRPr sz="4500" b="0" i="0" u="none" strike="noStrike" cap="none" dirty="0">
+              <a:solidFill>
+                <a:schemeClr val="dk1"/>
+              </a:solidFill>
+              <a:latin typeface="Arial"/>
+              <a:ea typeface="Arial"/>
+              <a:cs typeface="Arial"/>
+              <a:sym typeface="Arial"/>
+            </a:endParaRPr>
+          </a:p>
+        </p:txBody>
+      </p:sp>
+      <p:sp>
+        <p:nvSpPr>
+          <p:cNvPr id="272" name="Google Shape;272;p33"/>
+          <p:cNvSpPr txBox="1">
+            <a:spLocks noGrp="1"/>
+          </p:cNvSpPr>
+          <p:nvPr>
+            <p:ph type="body" idx="1"/>
+          </p:nvPr>
+        </p:nvSpPr>
+        <p:spPr>
+          <a:xfrm>
+            <a:off x="831851" y="4589467"/>
+            <a:ext cx="10515600" cy="1500187"/>
+          </a:xfrm>
+          <a:prstGeom prst="rect">
+            <a:avLst/>
+          </a:prstGeom>
+          <a:noFill/>
+          <a:ln>
+            <a:noFill/>
+          </a:ln>
+        </p:spPr>
+        <p:txBody>
+          <a:bodyPr spcFirstLastPara="1" wrap="square" lIns="91425" tIns="45700" rIns="91425" bIns="45700" anchor="t" anchorCtr="0">
+            <a:normAutofit/>
+          </a:bodyPr>
+          <a:lstStyle/>
+          <a:p>
+            <a:pPr marL="457200" lvl="0" indent="-228600" algn="l" rtl="0">
+              <a:lnSpc>
+                <a:spcPct val="90000"/>
+              </a:lnSpc>
+              <a:spcBef>
+                <a:spcPts val="750"/>
+              </a:spcBef>
+              <a:spcAft>
+                <a:spcPts val="0"/>
+              </a:spcAft>
+              <a:buClr>
+                <a:srgbClr val="888888"/>
+              </a:buClr>
+              <a:buSzPts val="1800"/>
+              <a:buNone/>
+            </a:pPr>
+            <a:endParaRPr sz="1800" b="0" i="0" u="none" strike="noStrike" cap="none">
+              <a:solidFill>
+                <a:srgbClr val="888888"/>
+              </a:solidFill>
+              <a:latin typeface="Arial"/>
+              <a:ea typeface="Arial"/>
+              <a:cs typeface="Arial"/>
+              <a:sym typeface="Arial"/>
+            </a:endParaRPr>
+          </a:p>
+        </p:txBody>
+      </p:sp>
+      <p:cxnSp>
+        <p:nvCxnSpPr>
+          <p:cNvPr id="273" name="Google Shape;273;p33"/>
+          <p:cNvCxnSpPr/>
+          <p:nvPr/>
+        </p:nvCxnSpPr>
+        <p:spPr>
+          <a:xfrm>
+            <a:off x="838200" y="4515556"/>
+            <a:ext cx="9829800" cy="0"/>
+          </a:xfrm>
+          <a:prstGeom prst="straightConnector1">
+            <a:avLst/>
+          </a:prstGeom>
+          <a:noFill/>
+          <a:ln w="25400" cap="flat" cmpd="sng">
+            <a:solidFill>
+              <a:srgbClr val="971B29"/>
+            </a:solidFill>
+            <a:prstDash val="solid"/>
+            <a:miter lim="800000"/>
+            <a:headEnd type="none" w="sm" len="sm"/>
+            <a:tailEnd type="none" w="sm" len="sm"/>
+          </a:ln>
+        </p:spPr>
+      </p:cxnSp>
+      <p:pic>
+        <p:nvPicPr>
+          <p:cNvPr id="274" name="Google Shape;274;p33"/>
+          <p:cNvPicPr preferRelativeResize="0"/>
+          <p:nvPr/>
+        </p:nvPicPr>
+        <p:blipFill rotWithShape="1">
+          <a:blip r:embed="rId4">
+            <a:alphaModFix amt="20000"/>
+          </a:blip>
+          <a:srcRect/>
+          <a:stretch/>
+        </p:blipFill>
+        <p:spPr>
+          <a:xfrm>
+            <a:off x="10724321" y="5247755"/>
+            <a:ext cx="1385827" cy="1291161"/>
+          </a:xfrm>
+          <a:prstGeom prst="rect">
+            <a:avLst/>
+          </a:prstGeom>
+          <a:noFill/>
+          <a:ln>
+            <a:noFill/>
+          </a:ln>
+        </p:spPr>
+      </p:pic>
+    </p:spTree>
+  </p:cSld>
+  <p:clrMapOvr>
+    <a:masterClrMapping/>
+  </p:clrMapOvr>
+</p:sld>
+</file>
+
+<file path=ppt/slides/slide16.xml><?xml version="1.0" encoding="utf-8"?>
+<p:sld xmlns:a="http://schemas.openxmlformats.org/drawingml/2006/main" xmlns:r="http://schemas.openxmlformats.org/officeDocument/2006/relationships" xmlns:p="http://schemas.openxmlformats.org/presentationml/2006/main">
+  <p:cSld>
+    <p:spTree>
+      <p:nvGrpSpPr>
+        <p:cNvPr id="1" name="Shape 248"/>
+        <p:cNvGrpSpPr/>
+        <p:nvPr/>
+      </p:nvGrpSpPr>
+      <p:grpSpPr>
+        <a:xfrm>
+          <a:off x="0" y="0"/>
+          <a:ext cx="0" cy="0"/>
+          <a:chOff x="0" y="0"/>
+          <a:chExt cx="0" cy="0"/>
+        </a:xfrm>
+      </p:grpSpPr>
+      <p:sp>
+        <p:nvSpPr>
+          <p:cNvPr id="249" name="Google Shape;249;p3"/>
+          <p:cNvSpPr txBox="1">
+            <a:spLocks noGrp="1"/>
+          </p:cNvSpPr>
+          <p:nvPr>
+            <p:ph type="title"/>
+          </p:nvPr>
+        </p:nvSpPr>
+        <p:spPr>
+          <a:xfrm>
+            <a:off x="838200" y="302420"/>
+            <a:ext cx="10515600" cy="1325563"/>
+          </a:xfrm>
+          <a:prstGeom prst="rect">
+            <a:avLst/>
+          </a:prstGeom>
+          <a:noFill/>
+          <a:ln>
+            <a:noFill/>
+          </a:ln>
+        </p:spPr>
+        <p:txBody>
+          <a:bodyPr spcFirstLastPara="1" wrap="square" lIns="91425" tIns="45700" rIns="91425" bIns="45700" anchor="ctr" anchorCtr="0">
+            <a:normAutofit/>
+          </a:bodyPr>
+          <a:lstStyle/>
+          <a:p>
+            <a:pPr marL="0" lvl="0" indent="0" algn="l" rtl="0">
+              <a:lnSpc>
+                <a:spcPct val="90000"/>
+              </a:lnSpc>
+              <a:spcBef>
+                <a:spcPts val="0"/>
+              </a:spcBef>
+              <a:spcAft>
+                <a:spcPts val="0"/>
+              </a:spcAft>
+              <a:buClr>
+                <a:schemeClr val="dk1"/>
+              </a:buClr>
+              <a:buSzPts val="3300"/>
+              <a:buFont typeface="Arial"/>
+              <a:buNone/>
+            </a:pPr>
+            <a:r>
+              <a:rPr lang="en-US"/>
+              <a:t>Project Deliverable</a:t>
+            </a:r>
+            <a:endParaRPr/>
+          </a:p>
+        </p:txBody>
+      </p:sp>
+      <p:pic>
+        <p:nvPicPr>
+          <p:cNvPr id="2" name="Picture 1">
+            <a:extLst>
+              <a:ext uri="{FF2B5EF4-FFF2-40B4-BE49-F238E27FC236}">
+                <a16:creationId xmlns:a16="http://schemas.microsoft.com/office/drawing/2014/main" id="{D4F3DFCC-6676-8141-8C7A-78FA254FBE62}"/>
+              </a:ext>
+            </a:extLst>
+          </p:cNvPr>
+          <p:cNvPicPr>
+            <a:picLocks noChangeAspect="1"/>
+          </p:cNvPicPr>
+          <p:nvPr/>
+        </p:nvPicPr>
+        <p:blipFill>
+          <a:blip r:embed="rId3"/>
+          <a:stretch>
+            <a:fillRect/>
+          </a:stretch>
+        </p:blipFill>
+        <p:spPr>
+          <a:xfrm>
+            <a:off x="838200" y="2158247"/>
+            <a:ext cx="9944819" cy="2258133"/>
+          </a:xfrm>
+          <a:prstGeom prst="rect">
+            <a:avLst/>
+          </a:prstGeom>
+        </p:spPr>
+      </p:pic>
+    </p:spTree>
+    <p:extLst>
+      <p:ext uri="{BB962C8B-B14F-4D97-AF65-F5344CB8AC3E}">
+        <p14:creationId xmlns:p14="http://schemas.microsoft.com/office/powerpoint/2010/main" val="2289630018"/>
+      </p:ext>
+    </p:extLst>
+  </p:cSld>
+  <p:clrMapOvr>
+    <a:masterClrMapping/>
+  </p:clrMapOvr>
+</p:sld>
+</file>
+
+<file path=ppt/slides/slide17.xml><?xml version="1.0" encoding="utf-8"?>
+<p:sld xmlns:a="http://schemas.openxmlformats.org/drawingml/2006/main" xmlns:r="http://schemas.openxmlformats.org/officeDocument/2006/relationships" xmlns:p="http://schemas.openxmlformats.org/presentationml/2006/main">
+  <p:cSld>
+    <p:spTree>
+      <p:nvGrpSpPr>
         <p:cNvPr id="1" name="Shape 269"/>
         <p:cNvGrpSpPr/>
         <p:nvPr/>
@@ -19564,7 +21087,7 @@
 </p:sld>
 </file>
 
-<file path=ppt/slides/slide11.xml><?xml version="1.0" encoding="utf-8"?>
+<file path=ppt/slides/slide18.xml><?xml version="1.0" encoding="utf-8"?>
 <p:sld xmlns:a="http://schemas.openxmlformats.org/drawingml/2006/main" xmlns:r="http://schemas.openxmlformats.org/officeDocument/2006/relationships" xmlns:p="http://schemas.openxmlformats.org/presentationml/2006/main">
   <p:cSld>
     <p:spTree>
@@ -19738,15 +21261,6 @@
           <a:ln>
             <a:noFill/>
           </a:ln>
-          <a:extLst>
-            <a:ext uri="{909E8E84-426E-40DD-AFC4-6F175D3DCCD1}">
-              <a14:hiddenFill xmlns:a14="http://schemas.microsoft.com/office/drawing/2010/main">
-                <a:solidFill>
-                  <a:srgbClr val="FFFFFF"/>
-                </a:solidFill>
-              </a14:hiddenFill>
-            </a:ext>
-          </a:extLst>
         </p:spPr>
       </p:pic>
     </p:spTree>
@@ -19762,7 +21276,7 @@
 </p:sld>
 </file>
 
-<file path=ppt/slides/slide12.xml><?xml version="1.0" encoding="utf-8"?>
+<file path=ppt/slides/slide19.xml><?xml version="1.0" encoding="utf-8"?>
 <p:sld xmlns:a="http://schemas.openxmlformats.org/drawingml/2006/main" xmlns:r="http://schemas.openxmlformats.org/officeDocument/2006/relationships" xmlns:p="http://schemas.openxmlformats.org/presentationml/2006/main">
   <p:cSld>
     <p:spTree>
@@ -19840,14 +21354,14 @@
           <p:nvPr>
             <p:extLst>
               <p:ext uri="{D42A27DB-BD31-4B8C-83A1-F6EECF244321}">
-                <p14:modId xmlns:p14="http://schemas.microsoft.com/office/powerpoint/2010/main" val="2156607588"/>
+                <p14:modId xmlns:p14="http://schemas.microsoft.com/office/powerpoint/2010/main" val="1245989396"/>
               </p:ext>
             </p:extLst>
           </p:nvPr>
         </p:nvGraphicFramePr>
         <p:xfrm>
           <a:off x="1117599" y="2548466"/>
-          <a:ext cx="9240625" cy="2966800"/>
+          <a:ext cx="9240625" cy="3114120"/>
         </p:xfrm>
         <a:graphic>
           <a:graphicData uri="http://schemas.openxmlformats.org/drawingml/2006/table">
@@ -20475,7 +21989,7 @@
                           <a:cs typeface="Arial"/>
                           <a:sym typeface="Arial"/>
                         </a:rPr>
-                        <a:t>Hierarchical Clustering</a:t>
+                        <a:t>Hierarchical Clustering – Ward Linkage</a:t>
                       </a:r>
                       <a:endParaRPr sz="1400" b="0" i="0" u="none" strike="noStrike" cap="none" dirty="0">
                         <a:solidFill>
@@ -20602,8 +22116,15 @@
                         <a:buNone/>
                       </a:pPr>
                       <a:r>
-                        <a:rPr lang="en-US" dirty="0"/>
-                        <a:t>Evaluate Results</a:t>
+                        <a:rPr lang="en-US" sz="1400" b="0" i="0" u="none" strike="noStrike" cap="none" dirty="0">
+                          <a:solidFill>
+                            <a:schemeClr val="dk1"/>
+                          </a:solidFill>
+                          <a:latin typeface="Arial"/>
+                          <a:cs typeface="Arial"/>
+                          <a:sym typeface="Arial"/>
+                        </a:rPr>
+                        <a:t>Hierarchical Clustering – Complete, Average, Single</a:t>
                       </a:r>
                       <a:endParaRPr dirty="0"/>
                     </a:p>
@@ -20767,7 +22288,408 @@
 </p:sld>
 </file>
 
-<file path=ppt/slides/slide13.xml><?xml version="1.0" encoding="utf-8"?>
+<file path=ppt/slides/slide2.xml><?xml version="1.0" encoding="utf-8"?>
+<p:sld xmlns:a="http://schemas.openxmlformats.org/drawingml/2006/main" xmlns:r="http://schemas.openxmlformats.org/officeDocument/2006/relationships" xmlns:p="http://schemas.openxmlformats.org/presentationml/2006/main">
+  <p:cSld>
+    <p:spTree>
+      <p:nvGrpSpPr>
+        <p:cNvPr id="1" name="Shape 149"/>
+        <p:cNvGrpSpPr/>
+        <p:nvPr/>
+      </p:nvGrpSpPr>
+      <p:grpSpPr>
+        <a:xfrm>
+          <a:off x="0" y="0"/>
+          <a:ext cx="0" cy="0"/>
+          <a:chOff x="0" y="0"/>
+          <a:chExt cx="0" cy="0"/>
+        </a:xfrm>
+      </p:grpSpPr>
+      <p:sp>
+        <p:nvSpPr>
+          <p:cNvPr id="150" name="Google Shape;150;p27"/>
+          <p:cNvSpPr txBox="1"/>
+          <p:nvPr/>
+        </p:nvSpPr>
+        <p:spPr>
+          <a:xfrm>
+            <a:off x="990600" y="1844401"/>
+            <a:ext cx="10515600" cy="4351338"/>
+          </a:xfrm>
+          <a:prstGeom prst="rect">
+            <a:avLst/>
+          </a:prstGeom>
+          <a:noFill/>
+          <a:ln>
+            <a:noFill/>
+          </a:ln>
+        </p:spPr>
+        <p:txBody>
+          <a:bodyPr spcFirstLastPara="1" wrap="square" lIns="91425" tIns="45700" rIns="91425" bIns="45700" anchor="t" anchorCtr="0">
+            <a:normAutofit/>
+          </a:bodyPr>
+          <a:lstStyle/>
+          <a:p>
+            <a:pPr marL="171446" lvl="0" indent="-38096" algn="l" rtl="0">
+              <a:lnSpc>
+                <a:spcPct val="90000"/>
+              </a:lnSpc>
+              <a:spcBef>
+                <a:spcPts val="0"/>
+              </a:spcBef>
+              <a:spcAft>
+                <a:spcPts val="0"/>
+              </a:spcAft>
+              <a:buNone/>
+            </a:pPr>
+            <a:r>
+              <a:rPr lang="en-US" sz="2300" dirty="0">
+                <a:solidFill>
+                  <a:schemeClr val="dk1"/>
+                </a:solidFill>
+              </a:rPr>
+              <a:t>To have the best session experience possible remember to:</a:t>
+            </a:r>
+            <a:endParaRPr sz="2300" dirty="0">
+              <a:solidFill>
+                <a:schemeClr val="dk1"/>
+              </a:solidFill>
+            </a:endParaRPr>
+          </a:p>
+          <a:p>
+            <a:pPr marL="171446" lvl="0" indent="-38096" algn="l" rtl="0">
+              <a:lnSpc>
+                <a:spcPct val="90000"/>
+              </a:lnSpc>
+              <a:spcBef>
+                <a:spcPts val="0"/>
+              </a:spcBef>
+              <a:spcAft>
+                <a:spcPts val="0"/>
+              </a:spcAft>
+              <a:buNone/>
+            </a:pPr>
+            <a:endParaRPr sz="2300" dirty="0">
+              <a:solidFill>
+                <a:schemeClr val="dk1"/>
+              </a:solidFill>
+            </a:endParaRPr>
+          </a:p>
+          <a:p>
+            <a:pPr marL="457200" lvl="0" indent="-374650" algn="l" rtl="0">
+              <a:lnSpc>
+                <a:spcPct val="90000"/>
+              </a:lnSpc>
+              <a:spcBef>
+                <a:spcPts val="0"/>
+              </a:spcBef>
+              <a:spcAft>
+                <a:spcPts val="0"/>
+              </a:spcAft>
+              <a:buClr>
+                <a:schemeClr val="dk1"/>
+              </a:buClr>
+              <a:buSzPts val="2300"/>
+              <a:buChar char="•"/>
+            </a:pPr>
+            <a:r>
+              <a:rPr lang="en-US" sz="2300" b="1" dirty="0">
+                <a:solidFill>
+                  <a:schemeClr val="dk1"/>
+                </a:solidFill>
+              </a:rPr>
+              <a:t>Log in using your Northeastern credentials</a:t>
+            </a:r>
+            <a:r>
+              <a:rPr lang="en-US" sz="2300" dirty="0">
+                <a:solidFill>
+                  <a:schemeClr val="dk1"/>
+                </a:solidFill>
+              </a:rPr>
+              <a:t>. This will give you </a:t>
+            </a:r>
+            <a:br>
+              <a:rPr lang="en-US" sz="2300" dirty="0">
+                <a:solidFill>
+                  <a:schemeClr val="dk1"/>
+                </a:solidFill>
+              </a:rPr>
+            </a:br>
+            <a:r>
+              <a:rPr lang="en-US" sz="2300" dirty="0">
+                <a:solidFill>
+                  <a:schemeClr val="dk1"/>
+                </a:solidFill>
+              </a:rPr>
+              <a:t>full access to the chat and other meeting activities.</a:t>
+            </a:r>
+            <a:endParaRPr sz="2300" b="1" dirty="0">
+              <a:solidFill>
+                <a:schemeClr val="dk1"/>
+              </a:solidFill>
+            </a:endParaRPr>
+          </a:p>
+          <a:p>
+            <a:pPr marL="457200" lvl="0" indent="0" algn="l" rtl="0">
+              <a:lnSpc>
+                <a:spcPct val="90000"/>
+              </a:lnSpc>
+              <a:spcBef>
+                <a:spcPts val="0"/>
+              </a:spcBef>
+              <a:spcAft>
+                <a:spcPts val="0"/>
+              </a:spcAft>
+              <a:buNone/>
+            </a:pPr>
+            <a:endParaRPr sz="2300" b="1" dirty="0">
+              <a:solidFill>
+                <a:schemeClr val="dk1"/>
+              </a:solidFill>
+            </a:endParaRPr>
+          </a:p>
+          <a:p>
+            <a:pPr marL="457200" lvl="0" indent="-374650" algn="l" rtl="0">
+              <a:lnSpc>
+                <a:spcPct val="90000"/>
+              </a:lnSpc>
+              <a:spcBef>
+                <a:spcPts val="0"/>
+              </a:spcBef>
+              <a:spcAft>
+                <a:spcPts val="0"/>
+              </a:spcAft>
+              <a:buClr>
+                <a:schemeClr val="dk1"/>
+              </a:buClr>
+              <a:buSzPts val="2300"/>
+              <a:buChar char="•"/>
+            </a:pPr>
+            <a:r>
+              <a:rPr lang="en-US" sz="2300" b="1" dirty="0">
+                <a:solidFill>
+                  <a:schemeClr val="dk1"/>
+                </a:solidFill>
+              </a:rPr>
+              <a:t>Cameras on</a:t>
+            </a:r>
+            <a:r>
+              <a:rPr lang="en-US" sz="2300" dirty="0">
+                <a:solidFill>
+                  <a:schemeClr val="dk1"/>
+                </a:solidFill>
+              </a:rPr>
+              <a:t>! It is easier to build connections when you can see </a:t>
+            </a:r>
+            <a:br>
+              <a:rPr lang="en-US" sz="2300" dirty="0">
+                <a:solidFill>
+                  <a:schemeClr val="dk1"/>
+                </a:solidFill>
+              </a:rPr>
+            </a:br>
+            <a:r>
+              <a:rPr lang="en-US" sz="2300" dirty="0">
+                <a:solidFill>
+                  <a:schemeClr val="dk1"/>
+                </a:solidFill>
+              </a:rPr>
+              <a:t>who you’re working with. Please keep cameras on during </a:t>
+            </a:r>
+            <a:r>
+              <a:rPr lang="en-US" sz="2300">
+                <a:solidFill>
+                  <a:schemeClr val="dk1"/>
+                </a:solidFill>
+              </a:rPr>
+              <a:t>whole </a:t>
+            </a:r>
+            <a:br>
+              <a:rPr lang="en-US" sz="2300">
+                <a:solidFill>
+                  <a:schemeClr val="dk1"/>
+                </a:solidFill>
+              </a:rPr>
+            </a:br>
+            <a:r>
+              <a:rPr lang="en-US" sz="2300">
+                <a:solidFill>
+                  <a:schemeClr val="dk1"/>
+                </a:solidFill>
+              </a:rPr>
+              <a:t>group and </a:t>
+            </a:r>
+            <a:r>
+              <a:rPr lang="en-US" sz="2300" dirty="0">
+                <a:solidFill>
+                  <a:schemeClr val="dk1"/>
+                </a:solidFill>
+              </a:rPr>
+              <a:t>breakout room activities.</a:t>
+            </a:r>
+            <a:endParaRPr sz="2300" dirty="0">
+              <a:solidFill>
+                <a:schemeClr val="dk1"/>
+              </a:solidFill>
+            </a:endParaRPr>
+          </a:p>
+          <a:p>
+            <a:pPr marL="0" lvl="0" indent="0" algn="l" rtl="0">
+              <a:lnSpc>
+                <a:spcPct val="90000"/>
+              </a:lnSpc>
+              <a:spcBef>
+                <a:spcPts val="0"/>
+              </a:spcBef>
+              <a:spcAft>
+                <a:spcPts val="0"/>
+              </a:spcAft>
+              <a:buNone/>
+            </a:pPr>
+            <a:endParaRPr sz="2300" dirty="0">
+              <a:solidFill>
+                <a:schemeClr val="dk1"/>
+              </a:solidFill>
+            </a:endParaRPr>
+          </a:p>
+          <a:p>
+            <a:pPr marL="457200" lvl="0" indent="-374650" algn="l" rtl="0">
+              <a:lnSpc>
+                <a:spcPct val="90000"/>
+              </a:lnSpc>
+              <a:spcBef>
+                <a:spcPts val="0"/>
+              </a:spcBef>
+              <a:spcAft>
+                <a:spcPts val="0"/>
+              </a:spcAft>
+              <a:buClr>
+                <a:schemeClr val="dk1"/>
+              </a:buClr>
+              <a:buSzPts val="2300"/>
+              <a:buChar char="•"/>
+            </a:pPr>
+            <a:r>
+              <a:rPr lang="en-US" sz="2300" b="1" dirty="0">
+                <a:solidFill>
+                  <a:schemeClr val="dk1"/>
+                </a:solidFill>
+              </a:rPr>
+              <a:t>Open and download the materials affiliated with this session.</a:t>
+            </a:r>
+            <a:r>
+              <a:rPr lang="en-US" sz="2300" dirty="0">
+                <a:solidFill>
+                  <a:schemeClr val="dk1"/>
+                </a:solidFill>
+              </a:rPr>
+              <a:t> </a:t>
+            </a:r>
+            <a:br>
+              <a:rPr lang="en-US" sz="2300" dirty="0">
+                <a:solidFill>
+                  <a:schemeClr val="dk1"/>
+                </a:solidFill>
+              </a:rPr>
+            </a:br>
+            <a:r>
+              <a:rPr lang="en-US" sz="2300" dirty="0">
+                <a:solidFill>
+                  <a:schemeClr val="dk1"/>
+                </a:solidFill>
+              </a:rPr>
+              <a:t>In Teams go to Live Sessions→ Files→ Week # Materials (Date).</a:t>
+            </a:r>
+            <a:endParaRPr sz="2300" dirty="0">
+              <a:solidFill>
+                <a:schemeClr val="dk1"/>
+              </a:solidFill>
+            </a:endParaRPr>
+          </a:p>
+          <a:p>
+            <a:pPr marL="457200" marR="0" lvl="0" indent="0" algn="l" rtl="0">
+              <a:lnSpc>
+                <a:spcPct val="90000"/>
+              </a:lnSpc>
+              <a:spcBef>
+                <a:spcPts val="0"/>
+              </a:spcBef>
+              <a:spcAft>
+                <a:spcPts val="0"/>
+              </a:spcAft>
+              <a:buNone/>
+            </a:pPr>
+            <a:endParaRPr sz="2100" dirty="0">
+              <a:solidFill>
+                <a:schemeClr val="dk1"/>
+              </a:solidFill>
+            </a:endParaRPr>
+          </a:p>
+        </p:txBody>
+      </p:sp>
+      <p:sp>
+        <p:nvSpPr>
+          <p:cNvPr id="151" name="Google Shape;151;p27"/>
+          <p:cNvSpPr txBox="1">
+            <a:spLocks noGrp="1"/>
+          </p:cNvSpPr>
+          <p:nvPr>
+            <p:ph type="title"/>
+          </p:nvPr>
+        </p:nvSpPr>
+        <p:spPr>
+          <a:xfrm>
+            <a:off x="838200" y="302420"/>
+            <a:ext cx="10515600" cy="1325563"/>
+          </a:xfrm>
+          <a:prstGeom prst="rect">
+            <a:avLst/>
+          </a:prstGeom>
+          <a:noFill/>
+          <a:ln>
+            <a:noFill/>
+          </a:ln>
+        </p:spPr>
+        <p:txBody>
+          <a:bodyPr spcFirstLastPara="1" wrap="square" lIns="91425" tIns="45700" rIns="91425" bIns="45700" anchor="ctr" anchorCtr="0">
+            <a:normAutofit/>
+          </a:bodyPr>
+          <a:lstStyle/>
+          <a:p>
+            <a:pPr marL="0" lvl="0" indent="0" algn="l" rtl="0">
+              <a:lnSpc>
+                <a:spcPct val="90000"/>
+              </a:lnSpc>
+              <a:spcBef>
+                <a:spcPts val="0"/>
+              </a:spcBef>
+              <a:spcAft>
+                <a:spcPts val="0"/>
+              </a:spcAft>
+              <a:buClr>
+                <a:schemeClr val="dk1"/>
+              </a:buClr>
+              <a:buSzPts val="3300"/>
+              <a:buFont typeface="Arial"/>
+              <a:buNone/>
+            </a:pPr>
+            <a:r>
+              <a:rPr lang="en-US"/>
+              <a:t>Live Session Reminders</a:t>
+            </a:r>
+            <a:endParaRPr/>
+          </a:p>
+        </p:txBody>
+      </p:sp>
+    </p:spTree>
+  </p:cSld>
+  <p:clrMapOvr>
+    <a:masterClrMapping/>
+  </p:clrMapOvr>
+</p:sld>
+</file>
+
+<file path=ppt/slides/slide20.xml><?xml version="1.0" encoding="utf-8"?>
 <p:sld xmlns:a="http://schemas.openxmlformats.org/drawingml/2006/main" xmlns:r="http://schemas.openxmlformats.org/officeDocument/2006/relationships" xmlns:p="http://schemas.openxmlformats.org/presentationml/2006/main">
   <p:cSld>
     <p:spTree>
@@ -20888,7 +22810,7 @@
 </p:sld>
 </file>
 
-<file path=ppt/slides/slide14.xml><?xml version="1.0" encoding="utf-8"?>
+<file path=ppt/slides/slide21.xml><?xml version="1.0" encoding="utf-8"?>
 <p:sld xmlns:a="http://schemas.openxmlformats.org/drawingml/2006/main" xmlns:r="http://schemas.openxmlformats.org/officeDocument/2006/relationships" xmlns:p="http://schemas.openxmlformats.org/presentationml/2006/main">
   <p:cSld>
     <p:spTree>
@@ -21118,407 +23040,6 @@
         <p14:creationId xmlns:p14="http://schemas.microsoft.com/office/powerpoint/2010/main" val="85544972"/>
       </p:ext>
     </p:extLst>
-  </p:cSld>
-  <p:clrMapOvr>
-    <a:masterClrMapping/>
-  </p:clrMapOvr>
-</p:sld>
-</file>
-
-<file path=ppt/slides/slide2.xml><?xml version="1.0" encoding="utf-8"?>
-<p:sld xmlns:a="http://schemas.openxmlformats.org/drawingml/2006/main" xmlns:r="http://schemas.openxmlformats.org/officeDocument/2006/relationships" xmlns:p="http://schemas.openxmlformats.org/presentationml/2006/main">
-  <p:cSld>
-    <p:spTree>
-      <p:nvGrpSpPr>
-        <p:cNvPr id="1" name="Shape 149"/>
-        <p:cNvGrpSpPr/>
-        <p:nvPr/>
-      </p:nvGrpSpPr>
-      <p:grpSpPr>
-        <a:xfrm>
-          <a:off x="0" y="0"/>
-          <a:ext cx="0" cy="0"/>
-          <a:chOff x="0" y="0"/>
-          <a:chExt cx="0" cy="0"/>
-        </a:xfrm>
-      </p:grpSpPr>
-      <p:sp>
-        <p:nvSpPr>
-          <p:cNvPr id="150" name="Google Shape;150;p27"/>
-          <p:cNvSpPr txBox="1"/>
-          <p:nvPr/>
-        </p:nvSpPr>
-        <p:spPr>
-          <a:xfrm>
-            <a:off x="990600" y="1844401"/>
-            <a:ext cx="10515600" cy="4351338"/>
-          </a:xfrm>
-          <a:prstGeom prst="rect">
-            <a:avLst/>
-          </a:prstGeom>
-          <a:noFill/>
-          <a:ln>
-            <a:noFill/>
-          </a:ln>
-        </p:spPr>
-        <p:txBody>
-          <a:bodyPr spcFirstLastPara="1" wrap="square" lIns="91425" tIns="45700" rIns="91425" bIns="45700" anchor="t" anchorCtr="0">
-            <a:normAutofit/>
-          </a:bodyPr>
-          <a:lstStyle/>
-          <a:p>
-            <a:pPr marL="171446" lvl="0" indent="-38096" algn="l" rtl="0">
-              <a:lnSpc>
-                <a:spcPct val="90000"/>
-              </a:lnSpc>
-              <a:spcBef>
-                <a:spcPts val="0"/>
-              </a:spcBef>
-              <a:spcAft>
-                <a:spcPts val="0"/>
-              </a:spcAft>
-              <a:buNone/>
-            </a:pPr>
-            <a:r>
-              <a:rPr lang="en-US" sz="2300" dirty="0">
-                <a:solidFill>
-                  <a:schemeClr val="dk1"/>
-                </a:solidFill>
-              </a:rPr>
-              <a:t>To have the best session experience possible remember to:</a:t>
-            </a:r>
-            <a:endParaRPr sz="2300" dirty="0">
-              <a:solidFill>
-                <a:schemeClr val="dk1"/>
-              </a:solidFill>
-            </a:endParaRPr>
-          </a:p>
-          <a:p>
-            <a:pPr marL="171446" lvl="0" indent="-38096" algn="l" rtl="0">
-              <a:lnSpc>
-                <a:spcPct val="90000"/>
-              </a:lnSpc>
-              <a:spcBef>
-                <a:spcPts val="0"/>
-              </a:spcBef>
-              <a:spcAft>
-                <a:spcPts val="0"/>
-              </a:spcAft>
-              <a:buNone/>
-            </a:pPr>
-            <a:endParaRPr sz="2300" dirty="0">
-              <a:solidFill>
-                <a:schemeClr val="dk1"/>
-              </a:solidFill>
-            </a:endParaRPr>
-          </a:p>
-          <a:p>
-            <a:pPr marL="457200" lvl="0" indent="-374650" algn="l" rtl="0">
-              <a:lnSpc>
-                <a:spcPct val="90000"/>
-              </a:lnSpc>
-              <a:spcBef>
-                <a:spcPts val="0"/>
-              </a:spcBef>
-              <a:spcAft>
-                <a:spcPts val="0"/>
-              </a:spcAft>
-              <a:buClr>
-                <a:schemeClr val="dk1"/>
-              </a:buClr>
-              <a:buSzPts val="2300"/>
-              <a:buChar char="•"/>
-            </a:pPr>
-            <a:r>
-              <a:rPr lang="en-US" sz="2300" b="1" dirty="0">
-                <a:solidFill>
-                  <a:schemeClr val="dk1"/>
-                </a:solidFill>
-              </a:rPr>
-              <a:t>Log in using your Northeastern credentials</a:t>
-            </a:r>
-            <a:r>
-              <a:rPr lang="en-US" sz="2300" dirty="0">
-                <a:solidFill>
-                  <a:schemeClr val="dk1"/>
-                </a:solidFill>
-              </a:rPr>
-              <a:t>. This will give you </a:t>
-            </a:r>
-            <a:br>
-              <a:rPr lang="en-US" sz="2300" dirty="0">
-                <a:solidFill>
-                  <a:schemeClr val="dk1"/>
-                </a:solidFill>
-              </a:rPr>
-            </a:br>
-            <a:r>
-              <a:rPr lang="en-US" sz="2300" dirty="0">
-                <a:solidFill>
-                  <a:schemeClr val="dk1"/>
-                </a:solidFill>
-              </a:rPr>
-              <a:t>full access to the chat and other meeting activities.</a:t>
-            </a:r>
-            <a:endParaRPr sz="2300" b="1" dirty="0">
-              <a:solidFill>
-                <a:schemeClr val="dk1"/>
-              </a:solidFill>
-            </a:endParaRPr>
-          </a:p>
-          <a:p>
-            <a:pPr marL="457200" lvl="0" indent="0" algn="l" rtl="0">
-              <a:lnSpc>
-                <a:spcPct val="90000"/>
-              </a:lnSpc>
-              <a:spcBef>
-                <a:spcPts val="0"/>
-              </a:spcBef>
-              <a:spcAft>
-                <a:spcPts val="0"/>
-              </a:spcAft>
-              <a:buNone/>
-            </a:pPr>
-            <a:endParaRPr sz="2300" b="1" dirty="0">
-              <a:solidFill>
-                <a:schemeClr val="dk1"/>
-              </a:solidFill>
-            </a:endParaRPr>
-          </a:p>
-          <a:p>
-            <a:pPr marL="457200" lvl="0" indent="-374650" algn="l" rtl="0">
-              <a:lnSpc>
-                <a:spcPct val="90000"/>
-              </a:lnSpc>
-              <a:spcBef>
-                <a:spcPts val="0"/>
-              </a:spcBef>
-              <a:spcAft>
-                <a:spcPts val="0"/>
-              </a:spcAft>
-              <a:buClr>
-                <a:schemeClr val="dk1"/>
-              </a:buClr>
-              <a:buSzPts val="2300"/>
-              <a:buChar char="•"/>
-            </a:pPr>
-            <a:r>
-              <a:rPr lang="en-US" sz="2300" b="1" dirty="0">
-                <a:solidFill>
-                  <a:schemeClr val="dk1"/>
-                </a:solidFill>
-              </a:rPr>
-              <a:t>Cameras on</a:t>
-            </a:r>
-            <a:r>
-              <a:rPr lang="en-US" sz="2300" dirty="0">
-                <a:solidFill>
-                  <a:schemeClr val="dk1"/>
-                </a:solidFill>
-              </a:rPr>
-              <a:t>! It is easier to build connections when you can see </a:t>
-            </a:r>
-            <a:br>
-              <a:rPr lang="en-US" sz="2300" dirty="0">
-                <a:solidFill>
-                  <a:schemeClr val="dk1"/>
-                </a:solidFill>
-              </a:rPr>
-            </a:br>
-            <a:r>
-              <a:rPr lang="en-US" sz="2300" dirty="0">
-                <a:solidFill>
-                  <a:schemeClr val="dk1"/>
-                </a:solidFill>
-              </a:rPr>
-              <a:t>who you’re working with. Please keep cameras on during </a:t>
-            </a:r>
-            <a:r>
-              <a:rPr lang="en-US" sz="2300">
-                <a:solidFill>
-                  <a:schemeClr val="dk1"/>
-                </a:solidFill>
-              </a:rPr>
-              <a:t>whole </a:t>
-            </a:r>
-            <a:br>
-              <a:rPr lang="en-US" sz="2300">
-                <a:solidFill>
-                  <a:schemeClr val="dk1"/>
-                </a:solidFill>
-              </a:rPr>
-            </a:br>
-            <a:r>
-              <a:rPr lang="en-US" sz="2300">
-                <a:solidFill>
-                  <a:schemeClr val="dk1"/>
-                </a:solidFill>
-              </a:rPr>
-              <a:t>group and </a:t>
-            </a:r>
-            <a:r>
-              <a:rPr lang="en-US" sz="2300" dirty="0">
-                <a:solidFill>
-                  <a:schemeClr val="dk1"/>
-                </a:solidFill>
-              </a:rPr>
-              <a:t>breakout room activities.</a:t>
-            </a:r>
-            <a:endParaRPr sz="2300" dirty="0">
-              <a:solidFill>
-                <a:schemeClr val="dk1"/>
-              </a:solidFill>
-            </a:endParaRPr>
-          </a:p>
-          <a:p>
-            <a:pPr marL="0" lvl="0" indent="0" algn="l" rtl="0">
-              <a:lnSpc>
-                <a:spcPct val="90000"/>
-              </a:lnSpc>
-              <a:spcBef>
-                <a:spcPts val="0"/>
-              </a:spcBef>
-              <a:spcAft>
-                <a:spcPts val="0"/>
-              </a:spcAft>
-              <a:buNone/>
-            </a:pPr>
-            <a:endParaRPr sz="2300" dirty="0">
-              <a:solidFill>
-                <a:schemeClr val="dk1"/>
-              </a:solidFill>
-            </a:endParaRPr>
-          </a:p>
-          <a:p>
-            <a:pPr marL="457200" lvl="0" indent="-374650" algn="l" rtl="0">
-              <a:lnSpc>
-                <a:spcPct val="90000"/>
-              </a:lnSpc>
-              <a:spcBef>
-                <a:spcPts val="0"/>
-              </a:spcBef>
-              <a:spcAft>
-                <a:spcPts val="0"/>
-              </a:spcAft>
-              <a:buClr>
-                <a:schemeClr val="dk1"/>
-              </a:buClr>
-              <a:buSzPts val="2300"/>
-              <a:buChar char="•"/>
-            </a:pPr>
-            <a:r>
-              <a:rPr lang="en-US" sz="2300" b="1" dirty="0">
-                <a:solidFill>
-                  <a:schemeClr val="dk1"/>
-                </a:solidFill>
-              </a:rPr>
-              <a:t>Open and download the materials affiliated with this session.</a:t>
-            </a:r>
-            <a:r>
-              <a:rPr lang="en-US" sz="2300" dirty="0">
-                <a:solidFill>
-                  <a:schemeClr val="dk1"/>
-                </a:solidFill>
-              </a:rPr>
-              <a:t> </a:t>
-            </a:r>
-            <a:br>
-              <a:rPr lang="en-US" sz="2300" dirty="0">
-                <a:solidFill>
-                  <a:schemeClr val="dk1"/>
-                </a:solidFill>
-              </a:rPr>
-            </a:br>
-            <a:r>
-              <a:rPr lang="en-US" sz="2300" dirty="0">
-                <a:solidFill>
-                  <a:schemeClr val="dk1"/>
-                </a:solidFill>
-              </a:rPr>
-              <a:t>In Teams go to Live Sessions→ Files→ Week # Materials (Date).</a:t>
-            </a:r>
-            <a:endParaRPr sz="2300" dirty="0">
-              <a:solidFill>
-                <a:schemeClr val="dk1"/>
-              </a:solidFill>
-            </a:endParaRPr>
-          </a:p>
-          <a:p>
-            <a:pPr marL="457200" marR="0" lvl="0" indent="0" algn="l" rtl="0">
-              <a:lnSpc>
-                <a:spcPct val="90000"/>
-              </a:lnSpc>
-              <a:spcBef>
-                <a:spcPts val="0"/>
-              </a:spcBef>
-              <a:spcAft>
-                <a:spcPts val="0"/>
-              </a:spcAft>
-              <a:buNone/>
-            </a:pPr>
-            <a:endParaRPr sz="2100" dirty="0">
-              <a:solidFill>
-                <a:schemeClr val="dk1"/>
-              </a:solidFill>
-            </a:endParaRPr>
-          </a:p>
-        </p:txBody>
-      </p:sp>
-      <p:sp>
-        <p:nvSpPr>
-          <p:cNvPr id="151" name="Google Shape;151;p27"/>
-          <p:cNvSpPr txBox="1">
-            <a:spLocks noGrp="1"/>
-          </p:cNvSpPr>
-          <p:nvPr>
-            <p:ph type="title"/>
-          </p:nvPr>
-        </p:nvSpPr>
-        <p:spPr>
-          <a:xfrm>
-            <a:off x="838200" y="302420"/>
-            <a:ext cx="10515600" cy="1325563"/>
-          </a:xfrm>
-          <a:prstGeom prst="rect">
-            <a:avLst/>
-          </a:prstGeom>
-          <a:noFill/>
-          <a:ln>
-            <a:noFill/>
-          </a:ln>
-        </p:spPr>
-        <p:txBody>
-          <a:bodyPr spcFirstLastPara="1" wrap="square" lIns="91425" tIns="45700" rIns="91425" bIns="45700" anchor="ctr" anchorCtr="0">
-            <a:normAutofit/>
-          </a:bodyPr>
-          <a:lstStyle/>
-          <a:p>
-            <a:pPr marL="0" lvl="0" indent="0" algn="l" rtl="0">
-              <a:lnSpc>
-                <a:spcPct val="90000"/>
-              </a:lnSpc>
-              <a:spcBef>
-                <a:spcPts val="0"/>
-              </a:spcBef>
-              <a:spcAft>
-                <a:spcPts val="0"/>
-              </a:spcAft>
-              <a:buClr>
-                <a:schemeClr val="dk1"/>
-              </a:buClr>
-              <a:buSzPts val="3300"/>
-              <a:buFont typeface="Arial"/>
-              <a:buNone/>
-            </a:pPr>
-            <a:r>
-              <a:rPr lang="en-US"/>
-              <a:t>Live Session Reminders</a:t>
-            </a:r>
-            <a:endParaRPr/>
-          </a:p>
-        </p:txBody>
-      </p:sp>
-    </p:spTree>
   </p:cSld>
   <p:clrMapOvr>
     <a:masterClrMapping/>
@@ -26278,239 +27799,7 @@
   <p:cSld>
     <p:spTree>
       <p:nvGrpSpPr>
-        <p:cNvPr id="1" name="Shape 269"/>
-        <p:cNvGrpSpPr/>
-        <p:nvPr/>
-      </p:nvGrpSpPr>
-      <p:grpSpPr>
-        <a:xfrm>
-          <a:off x="0" y="0"/>
-          <a:ext cx="0" cy="0"/>
-          <a:chOff x="0" y="0"/>
-          <a:chExt cx="0" cy="0"/>
-        </a:xfrm>
-      </p:grpSpPr>
-      <p:pic>
-        <p:nvPicPr>
-          <p:cNvPr id="270" name="Google Shape;270;p33"/>
-          <p:cNvPicPr preferRelativeResize="0"/>
-          <p:nvPr/>
-        </p:nvPicPr>
-        <p:blipFill rotWithShape="1">
-          <a:blip r:embed="rId3">
-            <a:alphaModFix/>
-          </a:blip>
-          <a:srcRect/>
-          <a:stretch/>
-        </p:blipFill>
-        <p:spPr>
-          <a:xfrm>
-            <a:off x="-1" y="0"/>
-            <a:ext cx="12192001" cy="6925056"/>
-          </a:xfrm>
-          <a:prstGeom prst="rect">
-            <a:avLst/>
-          </a:prstGeom>
-          <a:noFill/>
-          <a:ln>
-            <a:noFill/>
-          </a:ln>
-        </p:spPr>
-      </p:pic>
-      <p:sp>
-        <p:nvSpPr>
-          <p:cNvPr id="271" name="Google Shape;271;p33"/>
-          <p:cNvSpPr txBox="1">
-            <a:spLocks noGrp="1"/>
-          </p:cNvSpPr>
-          <p:nvPr>
-            <p:ph type="title"/>
-          </p:nvPr>
-        </p:nvSpPr>
-        <p:spPr>
-          <a:xfrm>
-            <a:off x="831851" y="1709742"/>
-            <a:ext cx="10515600" cy="2852737"/>
-          </a:xfrm>
-          <a:prstGeom prst="rect">
-            <a:avLst/>
-          </a:prstGeom>
-          <a:noFill/>
-          <a:ln>
-            <a:noFill/>
-          </a:ln>
-        </p:spPr>
-        <p:txBody>
-          <a:bodyPr spcFirstLastPara="1" wrap="square" lIns="91425" tIns="45700" rIns="91425" bIns="45700" anchor="b" anchorCtr="0">
-            <a:normAutofit/>
-          </a:bodyPr>
-          <a:lstStyle/>
-          <a:p>
-            <a:pPr marL="0" lvl="0" indent="0" algn="l" rtl="0">
-              <a:lnSpc>
-                <a:spcPct val="90000"/>
-              </a:lnSpc>
-              <a:spcBef>
-                <a:spcPts val="0"/>
-              </a:spcBef>
-              <a:spcAft>
-                <a:spcPts val="0"/>
-              </a:spcAft>
-              <a:buClr>
-                <a:schemeClr val="dk1"/>
-              </a:buClr>
-              <a:buSzPts val="4500"/>
-              <a:buFont typeface="Arial"/>
-              <a:buNone/>
-            </a:pPr>
-            <a:r>
-              <a:rPr lang="en-US" sz="4500" b="0" i="0" u="none" strike="noStrike" cap="none" dirty="0">
-                <a:solidFill>
-                  <a:schemeClr val="dk1"/>
-                </a:solidFill>
-                <a:latin typeface="Arial"/>
-                <a:ea typeface="Arial"/>
-                <a:cs typeface="Arial"/>
-                <a:sym typeface="Arial"/>
-              </a:rPr>
-              <a:t>Project Deliverables</a:t>
-            </a:r>
-            <a:endParaRPr sz="4500" b="0" i="0" u="none" strike="noStrike" cap="none" dirty="0">
-              <a:solidFill>
-                <a:schemeClr val="dk1"/>
-              </a:solidFill>
-              <a:latin typeface="Arial"/>
-              <a:ea typeface="Arial"/>
-              <a:cs typeface="Arial"/>
-              <a:sym typeface="Arial"/>
-            </a:endParaRPr>
-          </a:p>
-        </p:txBody>
-      </p:sp>
-      <p:sp>
-        <p:nvSpPr>
-          <p:cNvPr id="272" name="Google Shape;272;p33"/>
-          <p:cNvSpPr txBox="1">
-            <a:spLocks noGrp="1"/>
-          </p:cNvSpPr>
-          <p:nvPr>
-            <p:ph type="body" idx="1"/>
-          </p:nvPr>
-        </p:nvSpPr>
-        <p:spPr>
-          <a:xfrm>
-            <a:off x="831851" y="4589467"/>
-            <a:ext cx="10515600" cy="1500187"/>
-          </a:xfrm>
-          <a:prstGeom prst="rect">
-            <a:avLst/>
-          </a:prstGeom>
-          <a:noFill/>
-          <a:ln>
-            <a:noFill/>
-          </a:ln>
-        </p:spPr>
-        <p:txBody>
-          <a:bodyPr spcFirstLastPara="1" wrap="square" lIns="91425" tIns="45700" rIns="91425" bIns="45700" anchor="t" anchorCtr="0">
-            <a:normAutofit/>
-          </a:bodyPr>
-          <a:lstStyle/>
-          <a:p>
-            <a:pPr marL="457200" lvl="0" indent="-228600" algn="l" rtl="0">
-              <a:lnSpc>
-                <a:spcPct val="90000"/>
-              </a:lnSpc>
-              <a:spcBef>
-                <a:spcPts val="750"/>
-              </a:spcBef>
-              <a:spcAft>
-                <a:spcPts val="0"/>
-              </a:spcAft>
-              <a:buClr>
-                <a:srgbClr val="888888"/>
-              </a:buClr>
-              <a:buSzPts val="1800"/>
-              <a:buNone/>
-            </a:pPr>
-            <a:endParaRPr sz="1800" b="0" i="0" u="none" strike="noStrike" cap="none">
-              <a:solidFill>
-                <a:srgbClr val="888888"/>
-              </a:solidFill>
-              <a:latin typeface="Arial"/>
-              <a:ea typeface="Arial"/>
-              <a:cs typeface="Arial"/>
-              <a:sym typeface="Arial"/>
-            </a:endParaRPr>
-          </a:p>
-        </p:txBody>
-      </p:sp>
-      <p:cxnSp>
-        <p:nvCxnSpPr>
-          <p:cNvPr id="273" name="Google Shape;273;p33"/>
-          <p:cNvCxnSpPr/>
-          <p:nvPr/>
-        </p:nvCxnSpPr>
-        <p:spPr>
-          <a:xfrm>
-            <a:off x="838200" y="4515556"/>
-            <a:ext cx="9829800" cy="0"/>
-          </a:xfrm>
-          <a:prstGeom prst="straightConnector1">
-            <a:avLst/>
-          </a:prstGeom>
-          <a:noFill/>
-          <a:ln w="25400" cap="flat" cmpd="sng">
-            <a:solidFill>
-              <a:srgbClr val="971B29"/>
-            </a:solidFill>
-            <a:prstDash val="solid"/>
-            <a:miter lim="800000"/>
-            <a:headEnd type="none" w="sm" len="sm"/>
-            <a:tailEnd type="none" w="sm" len="sm"/>
-          </a:ln>
-        </p:spPr>
-      </p:cxnSp>
-      <p:pic>
-        <p:nvPicPr>
-          <p:cNvPr id="274" name="Google Shape;274;p33"/>
-          <p:cNvPicPr preferRelativeResize="0"/>
-          <p:nvPr/>
-        </p:nvPicPr>
-        <p:blipFill rotWithShape="1">
-          <a:blip r:embed="rId4">
-            <a:alphaModFix amt="20000"/>
-          </a:blip>
-          <a:srcRect/>
-          <a:stretch/>
-        </p:blipFill>
-        <p:spPr>
-          <a:xfrm>
-            <a:off x="10724321" y="5247755"/>
-            <a:ext cx="1385827" cy="1291161"/>
-          </a:xfrm>
-          <a:prstGeom prst="rect">
-            <a:avLst/>
-          </a:prstGeom>
-          <a:noFill/>
-          <a:ln>
-            <a:noFill/>
-          </a:ln>
-        </p:spPr>
-      </p:pic>
-    </p:spTree>
-  </p:cSld>
-  <p:clrMapOvr>
-    <a:masterClrMapping/>
-  </p:clrMapOvr>
-</p:sld>
-</file>
-
-<file path=ppt/slides/slide9.xml><?xml version="1.0" encoding="utf-8"?>
-<p:sld xmlns:a="http://schemas.openxmlformats.org/drawingml/2006/main" xmlns:r="http://schemas.openxmlformats.org/officeDocument/2006/relationships" xmlns:p="http://schemas.openxmlformats.org/presentationml/2006/main">
-  <p:cSld>
-    <p:spTree>
-      <p:nvGrpSpPr>
-        <p:cNvPr id="1" name="Shape 248"/>
+        <p:cNvPr id="1" name=""/>
         <p:cNvGrpSpPr/>
         <p:nvPr/>
       </p:nvGrpSpPr>
@@ -26524,64 +27813,239 @@
       </p:grpSpPr>
       <p:sp>
         <p:nvSpPr>
-          <p:cNvPr id="249" name="Google Shape;249;p3"/>
-          <p:cNvSpPr txBox="1">
+          <p:cNvPr id="2" name="Title 1">
+            <a:extLst>
+              <a:ext uri="{FF2B5EF4-FFF2-40B4-BE49-F238E27FC236}">
+                <a16:creationId xmlns:a16="http://schemas.microsoft.com/office/drawing/2014/main" id="{33B3371E-4076-D747-A85D-F62143BDC9B2}"/>
+              </a:ext>
+            </a:extLst>
+          </p:cNvPr>
+          <p:cNvSpPr>
             <a:spLocks noGrp="1"/>
           </p:cNvSpPr>
           <p:nvPr>
             <p:ph type="title"/>
           </p:nvPr>
         </p:nvSpPr>
-        <p:spPr>
-          <a:xfrm>
-            <a:off x="838200" y="302420"/>
-            <a:ext cx="10515600" cy="1325563"/>
-          </a:xfrm>
-          <a:prstGeom prst="rect">
-            <a:avLst/>
-          </a:prstGeom>
-          <a:noFill/>
-          <a:ln>
-            <a:noFill/>
-          </a:ln>
-        </p:spPr>
+        <p:spPr/>
         <p:txBody>
-          <a:bodyPr spcFirstLastPara="1" wrap="square" lIns="91425" tIns="45700" rIns="91425" bIns="45700" anchor="ctr" anchorCtr="0">
-            <a:normAutofit/>
-          </a:bodyPr>
+          <a:bodyPr/>
           <a:lstStyle/>
           <a:p>
-            <a:pPr marL="0" lvl="0" indent="0" algn="l" rtl="0">
-              <a:lnSpc>
-                <a:spcPct val="90000"/>
-              </a:lnSpc>
-              <a:spcBef>
-                <a:spcPts val="0"/>
-              </a:spcBef>
-              <a:spcAft>
-                <a:spcPts val="0"/>
-              </a:spcAft>
-              <a:buClr>
-                <a:schemeClr val="dk1"/>
-              </a:buClr>
-              <a:buSzPts val="3300"/>
-              <a:buFont typeface="Arial"/>
-              <a:buNone/>
-            </a:pPr>
             <a:r>
-              <a:rPr lang="en-US"/>
-              <a:t>Project Deliverable</a:t>
+              <a:rPr lang="en-US" dirty="0"/>
+              <a:t>More Concepts</a:t>
             </a:r>
-            <a:endParaRPr/>
+          </a:p>
+        </p:txBody>
+      </p:sp>
+      <p:sp>
+        <p:nvSpPr>
+          <p:cNvPr id="3" name="Text Placeholder 2">
+            <a:extLst>
+              <a:ext uri="{FF2B5EF4-FFF2-40B4-BE49-F238E27FC236}">
+                <a16:creationId xmlns:a16="http://schemas.microsoft.com/office/drawing/2014/main" id="{0F4F535B-3B1A-844F-AD19-4A042111A98E}"/>
+              </a:ext>
+            </a:extLst>
+          </p:cNvPr>
+          <p:cNvSpPr>
+            <a:spLocks noGrp="1"/>
+          </p:cNvSpPr>
+          <p:nvPr>
+            <p:ph type="body" idx="1"/>
+          </p:nvPr>
+        </p:nvSpPr>
+        <p:spPr/>
+        <p:txBody>
+          <a:bodyPr/>
+          <a:lstStyle/>
+          <a:p>
+            <a:r>
+              <a:rPr lang="en-US" dirty="0"/>
+              <a:t>Normalize Data</a:t>
+            </a:r>
+          </a:p>
+          <a:p>
+            <a:pPr lvl="1"/>
+            <a:r>
+              <a:rPr lang="en-US" dirty="0"/>
+              <a:t>Z-Score</a:t>
+            </a:r>
+          </a:p>
+          <a:p>
+            <a:r>
+              <a:rPr lang="en-US" dirty="0"/>
+              <a:t>K-Means</a:t>
+            </a:r>
+          </a:p>
+          <a:p>
+            <a:pPr lvl="1"/>
+            <a:r>
+              <a:rPr lang="en-US" dirty="0"/>
+              <a:t>Distance</a:t>
+            </a:r>
+          </a:p>
+          <a:p>
+            <a:pPr lvl="1"/>
+            <a:r>
+              <a:rPr lang="en-US" dirty="0"/>
+              <a:t>Number of Clusters</a:t>
+            </a:r>
+          </a:p>
+          <a:p>
+            <a:r>
+              <a:rPr lang="en-US" dirty="0"/>
+              <a:t>Hierarchical Clustering</a:t>
+            </a:r>
+          </a:p>
+          <a:p>
+            <a:pPr lvl="1"/>
+            <a:r>
+              <a:rPr lang="en-US" dirty="0"/>
+              <a:t>Top Down</a:t>
+            </a:r>
+          </a:p>
+          <a:p>
+            <a:pPr lvl="1"/>
+            <a:r>
+              <a:rPr lang="en-US" dirty="0"/>
+              <a:t>Bottom Up</a:t>
+            </a:r>
+          </a:p>
+        </p:txBody>
+      </p:sp>
+    </p:spTree>
+    <p:extLst>
+      <p:ext uri="{BB962C8B-B14F-4D97-AF65-F5344CB8AC3E}">
+        <p14:creationId xmlns:p14="http://schemas.microsoft.com/office/powerpoint/2010/main" val="3960953259"/>
+      </p:ext>
+    </p:extLst>
+  </p:cSld>
+  <p:clrMapOvr>
+    <a:masterClrMapping/>
+  </p:clrMapOvr>
+</p:sld>
+</file>
+
+<file path=ppt/slides/slide9.xml><?xml version="1.0" encoding="utf-8"?>
+<p:sld xmlns:a="http://schemas.openxmlformats.org/drawingml/2006/main" xmlns:r="http://schemas.openxmlformats.org/officeDocument/2006/relationships" xmlns:p="http://schemas.openxmlformats.org/presentationml/2006/main">
+  <p:cSld>
+    <p:spTree>
+      <p:nvGrpSpPr>
+        <p:cNvPr id="1" name=""/>
+        <p:cNvGrpSpPr/>
+        <p:nvPr/>
+      </p:nvGrpSpPr>
+      <p:grpSpPr>
+        <a:xfrm>
+          <a:off x="0" y="0"/>
+          <a:ext cx="0" cy="0"/>
+          <a:chOff x="0" y="0"/>
+          <a:chExt cx="0" cy="0"/>
+        </a:xfrm>
+      </p:grpSpPr>
+      <p:sp>
+        <p:nvSpPr>
+          <p:cNvPr id="2" name="Title 1">
+            <a:extLst>
+              <a:ext uri="{FF2B5EF4-FFF2-40B4-BE49-F238E27FC236}">
+                <a16:creationId xmlns:a16="http://schemas.microsoft.com/office/drawing/2014/main" id="{2EA2E602-0577-1947-8F04-6F258451C578}"/>
+              </a:ext>
+            </a:extLst>
+          </p:cNvPr>
+          <p:cNvSpPr>
+            <a:spLocks noGrp="1"/>
+          </p:cNvSpPr>
+          <p:nvPr>
+            <p:ph type="title"/>
+          </p:nvPr>
+        </p:nvSpPr>
+        <p:spPr/>
+        <p:txBody>
+          <a:bodyPr/>
+          <a:lstStyle/>
+          <a:p>
+            <a:r>
+              <a:rPr lang="en-US" dirty="0"/>
+              <a:t>K-Means</a:t>
+            </a:r>
+          </a:p>
+        </p:txBody>
+      </p:sp>
+      <p:sp>
+        <p:nvSpPr>
+          <p:cNvPr id="3" name="Text Placeholder 2">
+            <a:extLst>
+              <a:ext uri="{FF2B5EF4-FFF2-40B4-BE49-F238E27FC236}">
+                <a16:creationId xmlns:a16="http://schemas.microsoft.com/office/drawing/2014/main" id="{A3B2CEEC-F921-0F40-8AAE-47B44DB114BF}"/>
+              </a:ext>
+            </a:extLst>
+          </p:cNvPr>
+          <p:cNvSpPr>
+            <a:spLocks noGrp="1"/>
+          </p:cNvSpPr>
+          <p:nvPr>
+            <p:ph type="body" idx="1"/>
+          </p:nvPr>
+        </p:nvSpPr>
+        <p:spPr/>
+        <p:txBody>
+          <a:bodyPr/>
+          <a:lstStyle/>
+          <a:p>
+            <a:r>
+              <a:rPr lang="en-US" dirty="0"/>
+              <a:t>Between Clusters</a:t>
+            </a:r>
+          </a:p>
+          <a:p>
+            <a:pPr lvl="1"/>
+            <a:r>
+              <a:rPr lang="en-US" dirty="0"/>
+              <a:t>Maximize Distance</a:t>
+            </a:r>
+          </a:p>
+          <a:p>
+            <a:r>
+              <a:rPr lang="en-US" dirty="0"/>
+              <a:t>Within Clusters</a:t>
+            </a:r>
+          </a:p>
+          <a:p>
+            <a:pPr lvl="1"/>
+            <a:r>
+              <a:rPr lang="en-US" dirty="0"/>
+              <a:t>Minimize Distance</a:t>
+            </a:r>
+          </a:p>
+          <a:p>
+            <a:r>
+              <a:rPr lang="en-US" dirty="0"/>
+              <a:t>Key Concepts</a:t>
+            </a:r>
+          </a:p>
+          <a:p>
+            <a:pPr lvl="1"/>
+            <a:r>
+              <a:rPr lang="en-US" dirty="0"/>
+              <a:t>Centroids</a:t>
+            </a:r>
+          </a:p>
+          <a:p>
+            <a:pPr lvl="1"/>
+            <a:r>
+              <a:rPr lang="en-US" dirty="0"/>
+              <a:t>Euclidean Distance</a:t>
+            </a:r>
           </a:p>
         </p:txBody>
       </p:sp>
       <p:pic>
         <p:nvPicPr>
-          <p:cNvPr id="2" name="Picture 1">
+          <p:cNvPr id="4" name="Picture 3">
             <a:extLst>
               <a:ext uri="{FF2B5EF4-FFF2-40B4-BE49-F238E27FC236}">
-                <a16:creationId xmlns:a16="http://schemas.microsoft.com/office/drawing/2014/main" id="{D4F3DFCC-6676-8141-8C7A-78FA254FBE62}"/>
+                <a16:creationId xmlns:a16="http://schemas.microsoft.com/office/drawing/2014/main" id="{5EE0BAA6-73E2-A149-B156-B2F8B026A940}"/>
               </a:ext>
             </a:extLst>
           </p:cNvPr>
@@ -26591,15 +28055,15 @@
           <p:nvPr/>
         </p:nvPicPr>
         <p:blipFill>
-          <a:blip r:embed="rId3"/>
+          <a:blip r:embed="rId2"/>
           <a:stretch>
             <a:fillRect/>
           </a:stretch>
         </p:blipFill>
         <p:spPr>
           <a:xfrm>
-            <a:off x="838200" y="2158247"/>
-            <a:ext cx="9944819" cy="2258133"/>
+            <a:off x="7277073" y="2044698"/>
+            <a:ext cx="3340128" cy="3429001"/>
           </a:xfrm>
           <a:prstGeom prst="rect">
             <a:avLst/>
@@ -26609,7 +28073,7 @@
     </p:spTree>
     <p:extLst>
       <p:ext uri="{BB962C8B-B14F-4D97-AF65-F5344CB8AC3E}">
-        <p14:creationId xmlns:p14="http://schemas.microsoft.com/office/powerpoint/2010/main" val="2289630018"/>
+        <p14:creationId xmlns:p14="http://schemas.microsoft.com/office/powerpoint/2010/main" val="868759225"/>
       </p:ext>
     </p:extLst>
   </p:cSld>

</xml_diff>